<commit_message>
Updated some slides and ipynb file
</commit_message>
<xml_diff>
--- a/First_Pres.pptx
+++ b/First_Pres.pptx
@@ -10,9 +10,12 @@
     <p:sldId id="258" r:id="rId4"/>
     <p:sldId id="259" r:id="rId5"/>
     <p:sldId id="260" r:id="rId6"/>
-    <p:sldId id="263" r:id="rId7"/>
-    <p:sldId id="261" r:id="rId8"/>
-    <p:sldId id="262" r:id="rId9"/>
+    <p:sldId id="261" r:id="rId7"/>
+    <p:sldId id="263" r:id="rId8"/>
+    <p:sldId id="264" r:id="rId9"/>
+    <p:sldId id="265" r:id="rId10"/>
+    <p:sldId id="262" r:id="rId11"/>
+    <p:sldId id="266" r:id="rId12"/>
   </p:sldIdLst>
   <p:sldSz cx="12192000" cy="6858000"/>
   <p:notesSz cx="6858000" cy="9144000"/>
@@ -112,6 +115,25 @@
     </a:lvl9pPr>
   </p:defaultTextStyle>
   <p:extLst>
+    <p:ext uri="{521415D9-36F7-43E2-AB2F-B90AF26B5E84}">
+      <p14:sectionLst xmlns:p14="http://schemas.microsoft.com/office/powerpoint/2010/main">
+        <p14:section name="Default Section" id="{9B9E149D-4259-4EE2-AD61-53782A719387}">
+          <p14:sldIdLst>
+            <p14:sldId id="256"/>
+            <p14:sldId id="257"/>
+            <p14:sldId id="258"/>
+            <p14:sldId id="259"/>
+            <p14:sldId id="260"/>
+            <p14:sldId id="261"/>
+            <p14:sldId id="263"/>
+            <p14:sldId id="264"/>
+            <p14:sldId id="265"/>
+            <p14:sldId id="262"/>
+            <p14:sldId id="266"/>
+          </p14:sldIdLst>
+        </p14:section>
+      </p14:sectionLst>
+    </p:ext>
     <p:ext uri="{EFAFB233-063F-42B5-8137-9DF3F51BA10A}">
       <p15:sldGuideLst xmlns:p15="http://schemas.microsoft.com/office/powerpoint/2012/main"/>
     </p:ext>
@@ -10831,6 +10853,708 @@
 </p:sld>
 </file>
 
+<file path=ppt/slides/slide10.xml><?xml version="1.0" encoding="utf-8"?>
+<p:sld xmlns:a="http://schemas.openxmlformats.org/drawingml/2006/main" xmlns:r="http://schemas.openxmlformats.org/officeDocument/2006/relationships" xmlns:p="http://schemas.openxmlformats.org/presentationml/2006/main">
+  <p:cSld>
+    <p:bg>
+      <p:bgPr>
+        <a:solidFill>
+          <a:schemeClr val="bg2"/>
+        </a:solidFill>
+        <a:effectLst/>
+      </p:bgPr>
+    </p:bg>
+    <p:spTree>
+      <p:nvGrpSpPr>
+        <p:cNvPr id="1" name=""/>
+        <p:cNvGrpSpPr/>
+        <p:nvPr/>
+      </p:nvGrpSpPr>
+      <p:grpSpPr>
+        <a:xfrm>
+          <a:off x="0" y="0"/>
+          <a:ext cx="0" cy="0"/>
+          <a:chOff x="0" y="0"/>
+          <a:chExt cx="0" cy="0"/>
+        </a:xfrm>
+      </p:grpSpPr>
+      <p:sp useBgFill="1">
+        <p:nvSpPr>
+          <p:cNvPr id="23" name="Rectangle 22">
+            <a:extLst>
+              <a:ext uri="{FF2B5EF4-FFF2-40B4-BE49-F238E27FC236}">
+                <a16:creationId xmlns:a16="http://schemas.microsoft.com/office/drawing/2014/main" id="{987A0FBA-CC04-4256-A8EB-BB3C543E989C}"/>
+              </a:ext>
+              <a:ext uri="{C183D7F6-B498-43B3-948B-1728B52AA6E4}">
+                <adec:decorative xmlns:adec="http://schemas.microsoft.com/office/drawing/2017/decorative" val="1"/>
+              </a:ext>
+            </a:extLst>
+          </p:cNvPr>
+          <p:cNvSpPr>
+            <a:spLocks noGrp="1" noRot="1" noChangeAspect="1" noMove="1" noResize="1" noEditPoints="1" noAdjustHandles="1" noChangeArrowheads="1" noChangeShapeType="1" noTextEdit="1"/>
+          </p:cNvSpPr>
+          <p:nvPr>
+            <p:extLst>
+              <p:ext uri="{386F3935-93C4-4BCD-93E2-E3B085C9AB24}">
+                <p16:designElem xmlns:p16="http://schemas.microsoft.com/office/powerpoint/2015/main" val="1"/>
+              </p:ext>
+            </p:extLst>
+          </p:nvPr>
+        </p:nvSpPr>
+        <p:spPr>
+          <a:xfrm>
+            <a:off x="0" y="0"/>
+            <a:ext cx="12192000" cy="6858000"/>
+          </a:xfrm>
+          <a:prstGeom prst="rect">
+            <a:avLst/>
+          </a:prstGeom>
+          <a:ln w="12700" cap="flat" cmpd="sng" algn="ctr">
+            <a:noFill/>
+            <a:prstDash val="solid"/>
+            <a:miter lim="800000"/>
+          </a:ln>
+          <a:effectLst/>
+          <a:extLst>
+            <a:ext uri="{91240B29-F687-4F45-9708-019B960494DF}">
+              <a14:hiddenLine xmlns:a14="http://schemas.microsoft.com/office/drawing/2010/main" w="12700" cap="flat" cmpd="sng" algn="ctr">
+                <a:solidFill>
+                  <a:schemeClr val="accent1">
+                    <a:shade val="50000"/>
+                  </a:schemeClr>
+                </a:solidFill>
+                <a:prstDash val="solid"/>
+                <a:miter lim="800000"/>
+              </a14:hiddenLine>
+            </a:ext>
+          </a:extLst>
+        </p:spPr>
+        <p:style>
+          <a:lnRef idx="2">
+            <a:schemeClr val="accent1">
+              <a:shade val="50000"/>
+            </a:schemeClr>
+          </a:lnRef>
+          <a:fillRef idx="1">
+            <a:schemeClr val="accent1"/>
+          </a:fillRef>
+          <a:effectRef idx="0">
+            <a:schemeClr val="accent1"/>
+          </a:effectRef>
+          <a:fontRef idx="minor">
+            <a:schemeClr val="lt1"/>
+          </a:fontRef>
+        </p:style>
+        <p:txBody>
+          <a:bodyPr rtlCol="0" anchor="ctr"/>
+          <a:lstStyle/>
+          <a:p>
+            <a:pPr algn="ctr"/>
+            <a:endParaRPr lang="en-US"/>
+          </a:p>
+        </p:txBody>
+      </p:sp>
+      <p:pic>
+        <p:nvPicPr>
+          <p:cNvPr id="5" name="Picture 4" descr="Colourful pins linked with threads">
+            <a:extLst>
+              <a:ext uri="{FF2B5EF4-FFF2-40B4-BE49-F238E27FC236}">
+                <a16:creationId xmlns:a16="http://schemas.microsoft.com/office/drawing/2014/main" id="{5A9E7762-5301-93B0-E5B5-0710D39F1BAC}"/>
+              </a:ext>
+            </a:extLst>
+          </p:cNvPr>
+          <p:cNvPicPr>
+            <a:picLocks noChangeAspect="1"/>
+          </p:cNvPicPr>
+          <p:nvPr/>
+        </p:nvPicPr>
+        <p:blipFill rotWithShape="1">
+          <a:blip r:embed="rId2"/>
+          <a:srcRect l="21764" r="16695" b="2"/>
+          <a:stretch/>
+        </p:blipFill>
+        <p:spPr>
+          <a:xfrm>
+            <a:off x="2" y="10"/>
+            <a:ext cx="5578823" cy="6028246"/>
+          </a:xfrm>
+          <a:custGeom>
+            <a:avLst/>
+            <a:gdLst/>
+            <a:ahLst/>
+            <a:cxnLst/>
+            <a:rect l="l" t="t" r="r" b="b"/>
+            <a:pathLst>
+              <a:path w="5578823" h="6028256">
+                <a:moveTo>
+                  <a:pt x="0" y="0"/>
+                </a:moveTo>
+                <a:lnTo>
+                  <a:pt x="3897606" y="0"/>
+                </a:lnTo>
+                <a:lnTo>
+                  <a:pt x="4274232" y="360545"/>
+                </a:lnTo>
+                <a:cubicBezTo>
+                  <a:pt x="4408856" y="488910"/>
+                  <a:pt x="4542134" y="615181"/>
+                  <a:pt x="4673934" y="738354"/>
+                </a:cubicBezTo>
+                <a:cubicBezTo>
+                  <a:pt x="5042663" y="1082881"/>
+                  <a:pt x="5282330" y="1428108"/>
+                  <a:pt x="5421862" y="1773839"/>
+                </a:cubicBezTo>
+                <a:cubicBezTo>
+                  <a:pt x="5631101" y="2292214"/>
+                  <a:pt x="5614731" y="2811325"/>
+                  <a:pt x="5469198" y="3329255"/>
+                </a:cubicBezTo>
+                <a:cubicBezTo>
+                  <a:pt x="5323662" y="3847185"/>
+                  <a:pt x="5048962" y="4363935"/>
+                  <a:pt x="4741546" y="4877588"/>
+                </a:cubicBezTo>
+                <a:cubicBezTo>
+                  <a:pt x="4027238" y="6071494"/>
+                  <a:pt x="2764972" y="6102970"/>
+                  <a:pt x="1325600" y="5980388"/>
+                </a:cubicBezTo>
+                <a:cubicBezTo>
+                  <a:pt x="903947" y="5944442"/>
+                  <a:pt x="499735" y="5907589"/>
+                  <a:pt x="137593" y="5804042"/>
+                </a:cubicBezTo>
+                <a:lnTo>
+                  <a:pt x="0" y="5760161"/>
+                </a:lnTo>
+                <a:close/>
+              </a:path>
+            </a:pathLst>
+          </a:custGeom>
+        </p:spPr>
+      </p:pic>
+      <p:sp>
+        <p:nvSpPr>
+          <p:cNvPr id="25" name="Freeform: Shape 24">
+            <a:extLst>
+              <a:ext uri="{FF2B5EF4-FFF2-40B4-BE49-F238E27FC236}">
+                <a16:creationId xmlns:a16="http://schemas.microsoft.com/office/drawing/2014/main" id="{E633B38B-B87A-4288-A20F-0223A6C27A5A}"/>
+              </a:ext>
+              <a:ext uri="{C183D7F6-B498-43B3-948B-1728B52AA6E4}">
+                <adec:decorative xmlns:adec="http://schemas.microsoft.com/office/drawing/2017/decorative" val="1"/>
+              </a:ext>
+            </a:extLst>
+          </p:cNvPr>
+          <p:cNvSpPr>
+            <a:spLocks noGrp="1" noRot="1" noChangeAspect="1" noMove="1" noResize="1" noEditPoints="1" noAdjustHandles="1" noChangeArrowheads="1" noChangeShapeType="1" noTextEdit="1"/>
+          </p:cNvSpPr>
+          <p:nvPr>
+            <p:extLst>
+              <p:ext uri="{386F3935-93C4-4BCD-93E2-E3B085C9AB24}">
+                <p16:designElem xmlns:p16="http://schemas.microsoft.com/office/powerpoint/2015/main" val="1"/>
+              </p:ext>
+            </p:extLst>
+          </p:nvPr>
+        </p:nvSpPr>
+        <p:spPr>
+          <a:xfrm>
+            <a:off x="-1" y="0"/>
+            <a:ext cx="5704117" cy="6096000"/>
+          </a:xfrm>
+          <a:custGeom>
+            <a:avLst/>
+            <a:gdLst>
+              <a:gd name="connsiteX0" fmla="*/ 0 w 5704117"/>
+              <a:gd name="connsiteY0" fmla="*/ 0 h 6096000"/>
+              <a:gd name="connsiteX1" fmla="*/ 4562795 w 5704117"/>
+              <a:gd name="connsiteY1" fmla="*/ 0 h 6096000"/>
+              <a:gd name="connsiteX2" fmla="*/ 4721192 w 5704117"/>
+              <a:gd name="connsiteY2" fmla="*/ 133595 h 6096000"/>
+              <a:gd name="connsiteX3" fmla="*/ 5467522 w 5704117"/>
+              <a:gd name="connsiteY3" fmla="*/ 1054328 h 6096000"/>
+              <a:gd name="connsiteX4" fmla="*/ 5538873 w 5704117"/>
+              <a:gd name="connsiteY4" fmla="*/ 2897564 h 6096000"/>
+              <a:gd name="connsiteX5" fmla="*/ 4442050 w 5704117"/>
+              <a:gd name="connsiteY5" fmla="*/ 4732407 h 6096000"/>
+              <a:gd name="connsiteX6" fmla="*/ 93046 w 5704117"/>
+              <a:gd name="connsiteY6" fmla="*/ 6082857 h 6096000"/>
+              <a:gd name="connsiteX7" fmla="*/ 0 w 5704117"/>
+              <a:gd name="connsiteY7" fmla="*/ 6078450 h 6096000"/>
+              <a:gd name="connsiteX0" fmla="*/ 4562795 w 5704117"/>
+              <a:gd name="connsiteY0" fmla="*/ 0 h 6096000"/>
+              <a:gd name="connsiteX1" fmla="*/ 4721192 w 5704117"/>
+              <a:gd name="connsiteY1" fmla="*/ 133595 h 6096000"/>
+              <a:gd name="connsiteX2" fmla="*/ 5467522 w 5704117"/>
+              <a:gd name="connsiteY2" fmla="*/ 1054328 h 6096000"/>
+              <a:gd name="connsiteX3" fmla="*/ 5538873 w 5704117"/>
+              <a:gd name="connsiteY3" fmla="*/ 2897564 h 6096000"/>
+              <a:gd name="connsiteX4" fmla="*/ 4442050 w 5704117"/>
+              <a:gd name="connsiteY4" fmla="*/ 4732407 h 6096000"/>
+              <a:gd name="connsiteX5" fmla="*/ 93046 w 5704117"/>
+              <a:gd name="connsiteY5" fmla="*/ 6082857 h 6096000"/>
+              <a:gd name="connsiteX6" fmla="*/ 0 w 5704117"/>
+              <a:gd name="connsiteY6" fmla="*/ 6078450 h 6096000"/>
+              <a:gd name="connsiteX7" fmla="*/ 91440 w 5704117"/>
+              <a:gd name="connsiteY7" fmla="*/ 91440 h 6096000"/>
+              <a:gd name="connsiteX0" fmla="*/ 4562795 w 5704117"/>
+              <a:gd name="connsiteY0" fmla="*/ 0 h 6096000"/>
+              <a:gd name="connsiteX1" fmla="*/ 4721192 w 5704117"/>
+              <a:gd name="connsiteY1" fmla="*/ 133595 h 6096000"/>
+              <a:gd name="connsiteX2" fmla="*/ 5467522 w 5704117"/>
+              <a:gd name="connsiteY2" fmla="*/ 1054328 h 6096000"/>
+              <a:gd name="connsiteX3" fmla="*/ 5538873 w 5704117"/>
+              <a:gd name="connsiteY3" fmla="*/ 2897564 h 6096000"/>
+              <a:gd name="connsiteX4" fmla="*/ 4442050 w 5704117"/>
+              <a:gd name="connsiteY4" fmla="*/ 4732407 h 6096000"/>
+              <a:gd name="connsiteX5" fmla="*/ 93046 w 5704117"/>
+              <a:gd name="connsiteY5" fmla="*/ 6082857 h 6096000"/>
+              <a:gd name="connsiteX6" fmla="*/ 0 w 5704117"/>
+              <a:gd name="connsiteY6" fmla="*/ 6078450 h 6096000"/>
+            </a:gdLst>
+            <a:ahLst/>
+            <a:cxnLst>
+              <a:cxn ang="0">
+                <a:pos x="connsiteX0" y="connsiteY0"/>
+              </a:cxn>
+              <a:cxn ang="0">
+                <a:pos x="connsiteX1" y="connsiteY1"/>
+              </a:cxn>
+              <a:cxn ang="0">
+                <a:pos x="connsiteX2" y="connsiteY2"/>
+              </a:cxn>
+              <a:cxn ang="0">
+                <a:pos x="connsiteX3" y="connsiteY3"/>
+              </a:cxn>
+              <a:cxn ang="0">
+                <a:pos x="connsiteX4" y="connsiteY4"/>
+              </a:cxn>
+              <a:cxn ang="0">
+                <a:pos x="connsiteX5" y="connsiteY5"/>
+              </a:cxn>
+              <a:cxn ang="0">
+                <a:pos x="connsiteX6" y="connsiteY6"/>
+              </a:cxn>
+            </a:cxnLst>
+            <a:rect l="l" t="t" r="r" b="b"/>
+            <a:pathLst>
+              <a:path w="5704117" h="6096000">
+                <a:moveTo>
+                  <a:pt x="4562795" y="0"/>
+                </a:moveTo>
+                <a:lnTo>
+                  <a:pt x="4721192" y="133595"/>
+                </a:lnTo>
+                <a:cubicBezTo>
+                  <a:pt x="5067135" y="440105"/>
+                  <a:pt x="5309779" y="747048"/>
+                  <a:pt x="5467522" y="1054328"/>
+                </a:cubicBezTo>
+                <a:cubicBezTo>
+                  <a:pt x="5782917" y="1668625"/>
+                  <a:pt x="5758242" y="2283795"/>
+                  <a:pt x="5538873" y="2897564"/>
+                </a:cubicBezTo>
+                <a:cubicBezTo>
+                  <a:pt x="5319500" y="3511334"/>
+                  <a:pt x="4905433" y="4123706"/>
+                  <a:pt x="4442050" y="4732407"/>
+                </a:cubicBezTo>
+                <a:cubicBezTo>
+                  <a:pt x="3499930" y="5970384"/>
+                  <a:pt x="1925433" y="6153690"/>
+                  <a:pt x="93046" y="6082857"/>
+                </a:cubicBezTo>
+                <a:lnTo>
+                  <a:pt x="0" y="6078450"/>
+                </a:lnTo>
+              </a:path>
+            </a:pathLst>
+          </a:custGeom>
+          <a:noFill/>
+          <a:ln w="19050">
+            <a:solidFill>
+              <a:schemeClr val="accent2">
+                <a:lumMod val="60000"/>
+                <a:lumOff val="40000"/>
+              </a:schemeClr>
+            </a:solidFill>
+          </a:ln>
+        </p:spPr>
+        <p:style>
+          <a:lnRef idx="2">
+            <a:schemeClr val="accent1">
+              <a:shade val="50000"/>
+            </a:schemeClr>
+          </a:lnRef>
+          <a:fillRef idx="1">
+            <a:schemeClr val="accent1"/>
+          </a:fillRef>
+          <a:effectRef idx="0">
+            <a:schemeClr val="accent1"/>
+          </a:effectRef>
+          <a:fontRef idx="minor">
+            <a:schemeClr val="lt1"/>
+          </a:fontRef>
+        </p:style>
+        <p:txBody>
+          <a:bodyPr wrap="square" rtlCol="0" anchor="ctr">
+            <a:noAutofit/>
+          </a:bodyPr>
+          <a:lstStyle/>
+          <a:p>
+            <a:pPr algn="ctr"/>
+            <a:endParaRPr lang="en-US">
+              <a:solidFill>
+                <a:prstClr val="white"/>
+              </a:solidFill>
+              <a:latin typeface="Avenir Next LT Pro Light"/>
+            </a:endParaRPr>
+          </a:p>
+        </p:txBody>
+      </p:sp>
+      <p:sp>
+        <p:nvSpPr>
+          <p:cNvPr id="3" name="Content Placeholder 2">
+            <a:extLst>
+              <a:ext uri="{FF2B5EF4-FFF2-40B4-BE49-F238E27FC236}">
+                <a16:creationId xmlns:a16="http://schemas.microsoft.com/office/drawing/2014/main" id="{5464266E-25D4-16D9-F06E-69F751AD75F0}"/>
+              </a:ext>
+            </a:extLst>
+          </p:cNvPr>
+          <p:cNvSpPr>
+            <a:spLocks noGrp="1"/>
+          </p:cNvSpPr>
+          <p:nvPr>
+            <p:ph idx="1"/>
+          </p:nvPr>
+        </p:nvSpPr>
+        <p:spPr>
+          <a:xfrm>
+            <a:off x="5831457" y="1975449"/>
+            <a:ext cx="6090249" cy="4399472"/>
+          </a:xfrm>
+        </p:spPr>
+        <p:txBody>
+          <a:bodyPr vert="horz" lIns="91440" tIns="45720" rIns="91440" bIns="45720" rtlCol="0">
+            <a:normAutofit fontScale="92500" lnSpcReduction="20000"/>
+          </a:bodyPr>
+          <a:lstStyle/>
+          <a:p>
+            <a:pPr marL="0" indent="0">
+              <a:buNone/>
+            </a:pPr>
+            <a:r>
+              <a:rPr lang="en-US" sz="2400" dirty="0"/>
+              <a:t>We used multinomial Naïve Bayes model from </a:t>
+            </a:r>
+            <a:r>
+              <a:rPr lang="en-US" sz="2400" dirty="0" err="1"/>
+              <a:t>sklearn</a:t>
+            </a:r>
+            <a:r>
+              <a:rPr lang="en-US" sz="2400" dirty="0"/>
+              <a:t> library. </a:t>
+            </a:r>
+          </a:p>
+          <a:p>
+            <a:pPr marL="0" indent="0">
+              <a:buNone/>
+            </a:pPr>
+            <a:endParaRPr lang="en-US" sz="2400" dirty="0"/>
+          </a:p>
+          <a:p>
+            <a:pPr marL="0" indent="0">
+              <a:buNone/>
+            </a:pPr>
+            <a:r>
+              <a:rPr lang="en-US" sz="2400" b="1" dirty="0"/>
+              <a:t>Metrics used:-</a:t>
+            </a:r>
+          </a:p>
+          <a:p>
+            <a:pPr marL="0" indent="0">
+              <a:buNone/>
+            </a:pPr>
+            <a:r>
+              <a:rPr lang="en-US" sz="2400" dirty="0"/>
+              <a:t>We have used f1 score as a metric for measuring the output of the model.</a:t>
+            </a:r>
+          </a:p>
+          <a:p>
+            <a:pPr marL="0" indent="0">
+              <a:buNone/>
+            </a:pPr>
+            <a:endParaRPr lang="en-US" sz="2400" b="1" dirty="0"/>
+          </a:p>
+          <a:p>
+            <a:pPr marL="0" indent="0">
+              <a:buNone/>
+            </a:pPr>
+            <a:r>
+              <a:rPr lang="en-US" sz="2400" b="1" dirty="0"/>
+              <a:t>Our Observations:-</a:t>
+            </a:r>
+          </a:p>
+          <a:p>
+            <a:pPr marL="0" indent="0">
+              <a:buNone/>
+            </a:pPr>
+            <a:r>
+              <a:rPr lang="en-US" sz="2000" b="0" i="0" dirty="0">
+                <a:solidFill>
+                  <a:srgbClr val="B7C6DA"/>
+                </a:solidFill>
+                <a:effectLst/>
+              </a:rPr>
+              <a:t>train f1 score: 0.27023628048780485</a:t>
+            </a:r>
+          </a:p>
+          <a:p>
+            <a:pPr marL="0" indent="0">
+              <a:buNone/>
+            </a:pPr>
+            <a:r>
+              <a:rPr lang="en-US" sz="2000" b="0" i="0" dirty="0">
+                <a:solidFill>
+                  <a:srgbClr val="B7C6DA"/>
+                </a:solidFill>
+                <a:effectLst/>
+              </a:rPr>
+              <a:t>test f1 score: 0.22575387123064386</a:t>
+            </a:r>
+            <a:endParaRPr lang="en-US" sz="2000" dirty="0"/>
+          </a:p>
+        </p:txBody>
+      </p:sp>
+      <p:sp>
+        <p:nvSpPr>
+          <p:cNvPr id="4" name="TextBox 3">
+            <a:extLst>
+              <a:ext uri="{FF2B5EF4-FFF2-40B4-BE49-F238E27FC236}">
+                <a16:creationId xmlns:a16="http://schemas.microsoft.com/office/drawing/2014/main" id="{71CF42A1-CED4-215A-45EE-3B00CA958B82}"/>
+              </a:ext>
+            </a:extLst>
+          </p:cNvPr>
+          <p:cNvSpPr txBox="1"/>
+          <p:nvPr/>
+        </p:nvSpPr>
+        <p:spPr>
+          <a:xfrm>
+            <a:off x="6096000" y="330679"/>
+            <a:ext cx="5825706" cy="1754326"/>
+          </a:xfrm>
+          <a:prstGeom prst="rect">
+            <a:avLst/>
+          </a:prstGeom>
+          <a:noFill/>
+        </p:spPr>
+        <p:txBody>
+          <a:bodyPr wrap="square" rtlCol="0">
+            <a:spAutoFit/>
+          </a:bodyPr>
+          <a:lstStyle/>
+          <a:p>
+            <a:r>
+              <a:rPr lang="en-US" sz="3600" b="1" dirty="0">
+                <a:latin typeface="+mj-lt"/>
+              </a:rPr>
+              <a:t>1) Multinomial Naïve Bayes</a:t>
+            </a:r>
+          </a:p>
+          <a:p>
+            <a:endParaRPr lang="en-IN" sz="3600" dirty="0">
+              <a:latin typeface="+mj-lt"/>
+            </a:endParaRPr>
+          </a:p>
+        </p:txBody>
+      </p:sp>
+    </p:spTree>
+    <p:extLst>
+      <p:ext uri="{BB962C8B-B14F-4D97-AF65-F5344CB8AC3E}">
+        <p14:creationId xmlns:p14="http://schemas.microsoft.com/office/powerpoint/2010/main" val="2655718439"/>
+      </p:ext>
+    </p:extLst>
+  </p:cSld>
+  <p:clrMapOvr>
+    <a:masterClrMapping/>
+  </p:clrMapOvr>
+</p:sld>
+</file>
+
+<file path=ppt/slides/slide11.xml><?xml version="1.0" encoding="utf-8"?>
+<p:sld xmlns:a="http://schemas.openxmlformats.org/drawingml/2006/main" xmlns:r="http://schemas.openxmlformats.org/officeDocument/2006/relationships" xmlns:p="http://schemas.openxmlformats.org/presentationml/2006/main">
+  <p:cSld>
+    <p:spTree>
+      <p:nvGrpSpPr>
+        <p:cNvPr id="1" name=""/>
+        <p:cNvGrpSpPr/>
+        <p:nvPr/>
+      </p:nvGrpSpPr>
+      <p:grpSpPr>
+        <a:xfrm>
+          <a:off x="0" y="0"/>
+          <a:ext cx="0" cy="0"/>
+          <a:chOff x="0" y="0"/>
+          <a:chExt cx="0" cy="0"/>
+        </a:xfrm>
+      </p:grpSpPr>
+      <p:sp>
+        <p:nvSpPr>
+          <p:cNvPr id="2" name="Title 1">
+            <a:extLst>
+              <a:ext uri="{FF2B5EF4-FFF2-40B4-BE49-F238E27FC236}">
+                <a16:creationId xmlns:a16="http://schemas.microsoft.com/office/drawing/2014/main" id="{5258B78D-69DD-2D29-5D9E-652489669AFC}"/>
+              </a:ext>
+            </a:extLst>
+          </p:cNvPr>
+          <p:cNvSpPr>
+            <a:spLocks noGrp="1"/>
+          </p:cNvSpPr>
+          <p:nvPr>
+            <p:ph type="title"/>
+          </p:nvPr>
+        </p:nvSpPr>
+        <p:spPr/>
+        <p:txBody>
+          <a:bodyPr>
+            <a:normAutofit/>
+          </a:bodyPr>
+          <a:lstStyle/>
+          <a:p>
+            <a:r>
+              <a:rPr lang="en-US" sz="3600" dirty="0"/>
+              <a:t>2) Logistic Regression</a:t>
+            </a:r>
+            <a:endParaRPr lang="en-IN" sz="3600" dirty="0"/>
+          </a:p>
+        </p:txBody>
+      </p:sp>
+      <p:sp>
+        <p:nvSpPr>
+          <p:cNvPr id="3" name="Content Placeholder 2">
+            <a:extLst>
+              <a:ext uri="{FF2B5EF4-FFF2-40B4-BE49-F238E27FC236}">
+                <a16:creationId xmlns:a16="http://schemas.microsoft.com/office/drawing/2014/main" id="{813F234F-4BFE-E713-3635-48C1917AA6E7}"/>
+              </a:ext>
+            </a:extLst>
+          </p:cNvPr>
+          <p:cNvSpPr>
+            <a:spLocks noGrp="1"/>
+          </p:cNvSpPr>
+          <p:nvPr>
+            <p:ph idx="1"/>
+          </p:nvPr>
+        </p:nvSpPr>
+        <p:spPr/>
+        <p:txBody>
+          <a:bodyPr>
+            <a:normAutofit fontScale="77500" lnSpcReduction="20000"/>
+          </a:bodyPr>
+          <a:lstStyle/>
+          <a:p>
+            <a:pPr marL="0" indent="0">
+              <a:buNone/>
+            </a:pPr>
+            <a:r>
+              <a:rPr lang="en-US" sz="2800" dirty="0"/>
+              <a:t>We used multinomial Naïve Bayes model from </a:t>
+            </a:r>
+            <a:r>
+              <a:rPr lang="en-US" sz="2800" dirty="0" err="1"/>
+              <a:t>sklearn</a:t>
+            </a:r>
+            <a:r>
+              <a:rPr lang="en-US" sz="2800" dirty="0"/>
+              <a:t> library. </a:t>
+            </a:r>
+          </a:p>
+          <a:p>
+            <a:pPr marL="0" indent="0">
+              <a:buNone/>
+            </a:pPr>
+            <a:endParaRPr lang="en-US" sz="2800" dirty="0"/>
+          </a:p>
+          <a:p>
+            <a:pPr marL="0" indent="0">
+              <a:buNone/>
+            </a:pPr>
+            <a:r>
+              <a:rPr lang="en-US" sz="2800" b="1" dirty="0"/>
+              <a:t>Metrics used:-</a:t>
+            </a:r>
+          </a:p>
+          <a:p>
+            <a:pPr marL="0" indent="0">
+              <a:buNone/>
+            </a:pPr>
+            <a:r>
+              <a:rPr lang="en-US" sz="2800" dirty="0"/>
+              <a:t>We have used f1 score as a metric for measuring the output of the model.</a:t>
+            </a:r>
+          </a:p>
+          <a:p>
+            <a:pPr marL="0" indent="0">
+              <a:buNone/>
+            </a:pPr>
+            <a:endParaRPr lang="en-US" sz="2800" b="1" dirty="0"/>
+          </a:p>
+          <a:p>
+            <a:pPr marL="0" indent="0">
+              <a:buNone/>
+            </a:pPr>
+            <a:r>
+              <a:rPr lang="en-US" sz="2800" b="1" dirty="0"/>
+              <a:t>Our Observations:-</a:t>
+            </a:r>
+          </a:p>
+          <a:p>
+            <a:pPr marL="0" indent="0">
+              <a:buNone/>
+            </a:pPr>
+            <a:r>
+              <a:rPr lang="en-US" sz="2400" b="0" i="0" dirty="0">
+                <a:solidFill>
+                  <a:srgbClr val="B7C6DA"/>
+                </a:solidFill>
+                <a:effectLst/>
+              </a:rPr>
+              <a:t>train f1 score: 0.4851800490696576</a:t>
+            </a:r>
+          </a:p>
+          <a:p>
+            <a:pPr marL="0" indent="0">
+              <a:buNone/>
+            </a:pPr>
+            <a:r>
+              <a:rPr lang="en-US" sz="2400" b="0" i="0" dirty="0">
+                <a:solidFill>
+                  <a:srgbClr val="B7C6DA"/>
+                </a:solidFill>
+                <a:effectLst/>
+              </a:rPr>
+              <a:t>test f1 score: 0.4621717530163236</a:t>
+            </a:r>
+            <a:endParaRPr lang="en-US" sz="2400" dirty="0"/>
+          </a:p>
+          <a:p>
+            <a:endParaRPr lang="en-IN" dirty="0"/>
+          </a:p>
+        </p:txBody>
+      </p:sp>
+    </p:spTree>
+    <p:extLst>
+      <p:ext uri="{BB962C8B-B14F-4D97-AF65-F5344CB8AC3E}">
+        <p14:creationId xmlns:p14="http://schemas.microsoft.com/office/powerpoint/2010/main" val="2289187113"/>
+      </p:ext>
+    </p:extLst>
+  </p:cSld>
+  <p:clrMapOvr>
+    <a:masterClrMapping/>
+  </p:clrMapOvr>
+</p:sld>
+</file>
+
 <file path=ppt/slides/slide2.xml><?xml version="1.0" encoding="utf-8"?>
 <p:sld xmlns:a="http://schemas.openxmlformats.org/drawingml/2006/main" xmlns:r="http://schemas.openxmlformats.org/officeDocument/2006/relationships" xmlns:p="http://schemas.openxmlformats.org/presentationml/2006/main">
   <p:cSld>
@@ -12288,7 +13012,7 @@
               <a:buNone/>
             </a:pPr>
             <a:r>
-              <a:rPr lang="en-US" sz="2400"/>
+              <a:rPr lang="en-US" sz="2400" dirty="0"/>
               <a:t>This technique breaks down a given sentence into a list of words which can be then processed upon independently making stuff like the upcoming lemmatization and stop word removal easy. </a:t>
             </a:r>
           </a:p>
@@ -12323,8 +13047,8 @@
           <a:lstStyle/>
           <a:p>
             <a:r>
-              <a:rPr lang="en-US" sz="3200"/>
-              <a:t>Tokenization</a:t>
+              <a:rPr lang="en-US" sz="3200" dirty="0"/>
+              <a:t>Word Tokenization</a:t>
             </a:r>
           </a:p>
         </p:txBody>
@@ -13008,6 +13732,452 @@
 </file>
 
 <file path=ppt/slides/slide6.xml><?xml version="1.0" encoding="utf-8"?>
+<p:sld xmlns:a="http://schemas.openxmlformats.org/drawingml/2006/main" xmlns:r="http://schemas.openxmlformats.org/officeDocument/2006/relationships" xmlns:p="http://schemas.openxmlformats.org/presentationml/2006/main">
+  <p:cSld>
+    <p:bg>
+      <p:bgPr>
+        <a:solidFill>
+          <a:schemeClr val="bg2"/>
+        </a:solidFill>
+        <a:effectLst/>
+      </p:bgPr>
+    </p:bg>
+    <p:spTree>
+      <p:nvGrpSpPr>
+        <p:cNvPr id="1" name=""/>
+        <p:cNvGrpSpPr/>
+        <p:nvPr/>
+      </p:nvGrpSpPr>
+      <p:grpSpPr>
+        <a:xfrm>
+          <a:off x="0" y="0"/>
+          <a:ext cx="0" cy="0"/>
+          <a:chOff x="0" y="0"/>
+          <a:chExt cx="0" cy="0"/>
+        </a:xfrm>
+      </p:grpSpPr>
+      <p:sp useBgFill="1">
+        <p:nvSpPr>
+          <p:cNvPr id="9" name="Rectangle 8">
+            <a:extLst>
+              <a:ext uri="{FF2B5EF4-FFF2-40B4-BE49-F238E27FC236}">
+                <a16:creationId xmlns:a16="http://schemas.microsoft.com/office/drawing/2014/main" id="{987A0FBA-CC04-4256-A8EB-BB3C543E989C}"/>
+              </a:ext>
+              <a:ext uri="{C183D7F6-B498-43B3-948B-1728B52AA6E4}">
+                <adec:decorative xmlns:adec="http://schemas.microsoft.com/office/drawing/2017/decorative" val="1"/>
+              </a:ext>
+            </a:extLst>
+          </p:cNvPr>
+          <p:cNvSpPr>
+            <a:spLocks noGrp="1" noRot="1" noChangeAspect="1" noMove="1" noResize="1" noEditPoints="1" noAdjustHandles="1" noChangeArrowheads="1" noChangeShapeType="1" noTextEdit="1"/>
+          </p:cNvSpPr>
+          <p:nvPr>
+            <p:extLst>
+              <p:ext uri="{386F3935-93C4-4BCD-93E2-E3B085C9AB24}">
+                <p16:designElem xmlns:p16="http://schemas.microsoft.com/office/powerpoint/2015/main" val="1"/>
+              </p:ext>
+            </p:extLst>
+          </p:nvPr>
+        </p:nvSpPr>
+        <p:spPr>
+          <a:xfrm>
+            <a:off x="0" y="0"/>
+            <a:ext cx="12192000" cy="6858000"/>
+          </a:xfrm>
+          <a:prstGeom prst="rect">
+            <a:avLst/>
+          </a:prstGeom>
+          <a:ln w="12700" cap="flat" cmpd="sng" algn="ctr">
+            <a:noFill/>
+            <a:prstDash val="solid"/>
+            <a:miter lim="800000"/>
+          </a:ln>
+          <a:effectLst/>
+          <a:extLst>
+            <a:ext uri="{91240B29-F687-4F45-9708-019B960494DF}">
+              <a14:hiddenLine xmlns:a14="http://schemas.microsoft.com/office/drawing/2010/main" w="12700" cap="flat" cmpd="sng" algn="ctr">
+                <a:solidFill>
+                  <a:schemeClr val="accent1">
+                    <a:shade val="50000"/>
+                  </a:schemeClr>
+                </a:solidFill>
+                <a:prstDash val="solid"/>
+                <a:miter lim="800000"/>
+              </a14:hiddenLine>
+            </a:ext>
+          </a:extLst>
+        </p:spPr>
+        <p:style>
+          <a:lnRef idx="2">
+            <a:schemeClr val="accent1">
+              <a:shade val="50000"/>
+            </a:schemeClr>
+          </a:lnRef>
+          <a:fillRef idx="1">
+            <a:schemeClr val="accent1"/>
+          </a:fillRef>
+          <a:effectRef idx="0">
+            <a:schemeClr val="accent1"/>
+          </a:effectRef>
+          <a:fontRef idx="minor">
+            <a:schemeClr val="lt1"/>
+          </a:fontRef>
+        </p:style>
+        <p:txBody>
+          <a:bodyPr rtlCol="0" anchor="ctr"/>
+          <a:lstStyle/>
+          <a:p>
+            <a:pPr algn="ctr"/>
+            <a:endParaRPr lang="en-US"/>
+          </a:p>
+        </p:txBody>
+      </p:sp>
+      <p:pic>
+        <p:nvPicPr>
+          <p:cNvPr id="5" name="Picture 4" descr="Plant and roots">
+            <a:extLst>
+              <a:ext uri="{FF2B5EF4-FFF2-40B4-BE49-F238E27FC236}">
+                <a16:creationId xmlns:a16="http://schemas.microsoft.com/office/drawing/2014/main" id="{267B69F5-DBB5-F5B9-46CA-CA212257D10E}"/>
+              </a:ext>
+            </a:extLst>
+          </p:cNvPr>
+          <p:cNvPicPr>
+            <a:picLocks noChangeAspect="1"/>
+          </p:cNvPicPr>
+          <p:nvPr/>
+        </p:nvPicPr>
+        <p:blipFill rotWithShape="1">
+          <a:blip r:embed="rId2"/>
+          <a:srcRect l="835" r="10376" b="6"/>
+          <a:stretch/>
+        </p:blipFill>
+        <p:spPr>
+          <a:xfrm>
+            <a:off x="6613174" y="10"/>
+            <a:ext cx="5578824" cy="6028246"/>
+          </a:xfrm>
+          <a:custGeom>
+            <a:avLst/>
+            <a:gdLst/>
+            <a:ahLst/>
+            <a:cxnLst/>
+            <a:rect l="l" t="t" r="r" b="b"/>
+            <a:pathLst>
+              <a:path w="5578824" h="6028256">
+                <a:moveTo>
+                  <a:pt x="1681218" y="0"/>
+                </a:moveTo>
+                <a:lnTo>
+                  <a:pt x="5578824" y="0"/>
+                </a:lnTo>
+                <a:lnTo>
+                  <a:pt x="5578824" y="5760161"/>
+                </a:lnTo>
+                <a:lnTo>
+                  <a:pt x="5441231" y="5804042"/>
+                </a:lnTo>
+                <a:cubicBezTo>
+                  <a:pt x="5079089" y="5907589"/>
+                  <a:pt x="4674877" y="5944442"/>
+                  <a:pt x="4253224" y="5980388"/>
+                </a:cubicBezTo>
+                <a:cubicBezTo>
+                  <a:pt x="2813852" y="6102970"/>
+                  <a:pt x="1551586" y="6071494"/>
+                  <a:pt x="837278" y="4877588"/>
+                </a:cubicBezTo>
+                <a:cubicBezTo>
+                  <a:pt x="529862" y="4363935"/>
+                  <a:pt x="255162" y="3847185"/>
+                  <a:pt x="109626" y="3329255"/>
+                </a:cubicBezTo>
+                <a:cubicBezTo>
+                  <a:pt x="-35907" y="2811325"/>
+                  <a:pt x="-52277" y="2292214"/>
+                  <a:pt x="156962" y="1773839"/>
+                </a:cubicBezTo>
+                <a:cubicBezTo>
+                  <a:pt x="296494" y="1428108"/>
+                  <a:pt x="536161" y="1082881"/>
+                  <a:pt x="904890" y="738354"/>
+                </a:cubicBezTo>
+                <a:cubicBezTo>
+                  <a:pt x="1036690" y="615181"/>
+                  <a:pt x="1169968" y="488910"/>
+                  <a:pt x="1304592" y="360545"/>
+                </a:cubicBezTo>
+                <a:close/>
+              </a:path>
+            </a:pathLst>
+          </a:custGeom>
+        </p:spPr>
+      </p:pic>
+      <p:sp>
+        <p:nvSpPr>
+          <p:cNvPr id="11" name="Freeform: Shape 10">
+            <a:extLst>
+              <a:ext uri="{FF2B5EF4-FFF2-40B4-BE49-F238E27FC236}">
+                <a16:creationId xmlns:a16="http://schemas.microsoft.com/office/drawing/2014/main" id="{3362A0EA-3E81-4464-94B8-70BE5870EDC0}"/>
+              </a:ext>
+              <a:ext uri="{C183D7F6-B498-43B3-948B-1728B52AA6E4}">
+                <adec:decorative xmlns:adec="http://schemas.microsoft.com/office/drawing/2017/decorative" val="1"/>
+              </a:ext>
+            </a:extLst>
+          </p:cNvPr>
+          <p:cNvSpPr>
+            <a:spLocks noGrp="1" noRot="1" noChangeAspect="1" noMove="1" noResize="1" noEditPoints="1" noAdjustHandles="1" noChangeArrowheads="1" noChangeShapeType="1" noTextEdit="1"/>
+          </p:cNvSpPr>
+          <p:nvPr>
+            <p:extLst>
+              <p:ext uri="{386F3935-93C4-4BCD-93E2-E3B085C9AB24}">
+                <p16:designElem xmlns:p16="http://schemas.microsoft.com/office/powerpoint/2015/main" val="1"/>
+              </p:ext>
+            </p:extLst>
+          </p:nvPr>
+        </p:nvSpPr>
+        <p:spPr>
+          <a:xfrm flipH="1">
+            <a:off x="6487883" y="0"/>
+            <a:ext cx="5704117" cy="6096000"/>
+          </a:xfrm>
+          <a:custGeom>
+            <a:avLst/>
+            <a:gdLst>
+              <a:gd name="connsiteX0" fmla="*/ 0 w 5704117"/>
+              <a:gd name="connsiteY0" fmla="*/ 0 h 6096000"/>
+              <a:gd name="connsiteX1" fmla="*/ 4562795 w 5704117"/>
+              <a:gd name="connsiteY1" fmla="*/ 0 h 6096000"/>
+              <a:gd name="connsiteX2" fmla="*/ 4721192 w 5704117"/>
+              <a:gd name="connsiteY2" fmla="*/ 133595 h 6096000"/>
+              <a:gd name="connsiteX3" fmla="*/ 5467522 w 5704117"/>
+              <a:gd name="connsiteY3" fmla="*/ 1054328 h 6096000"/>
+              <a:gd name="connsiteX4" fmla="*/ 5538873 w 5704117"/>
+              <a:gd name="connsiteY4" fmla="*/ 2897564 h 6096000"/>
+              <a:gd name="connsiteX5" fmla="*/ 4442050 w 5704117"/>
+              <a:gd name="connsiteY5" fmla="*/ 4732407 h 6096000"/>
+              <a:gd name="connsiteX6" fmla="*/ 93046 w 5704117"/>
+              <a:gd name="connsiteY6" fmla="*/ 6082857 h 6096000"/>
+              <a:gd name="connsiteX7" fmla="*/ 0 w 5704117"/>
+              <a:gd name="connsiteY7" fmla="*/ 6078450 h 6096000"/>
+              <a:gd name="connsiteX0" fmla="*/ 4562795 w 5704117"/>
+              <a:gd name="connsiteY0" fmla="*/ 0 h 6096000"/>
+              <a:gd name="connsiteX1" fmla="*/ 4721192 w 5704117"/>
+              <a:gd name="connsiteY1" fmla="*/ 133595 h 6096000"/>
+              <a:gd name="connsiteX2" fmla="*/ 5467522 w 5704117"/>
+              <a:gd name="connsiteY2" fmla="*/ 1054328 h 6096000"/>
+              <a:gd name="connsiteX3" fmla="*/ 5538873 w 5704117"/>
+              <a:gd name="connsiteY3" fmla="*/ 2897564 h 6096000"/>
+              <a:gd name="connsiteX4" fmla="*/ 4442050 w 5704117"/>
+              <a:gd name="connsiteY4" fmla="*/ 4732407 h 6096000"/>
+              <a:gd name="connsiteX5" fmla="*/ 93046 w 5704117"/>
+              <a:gd name="connsiteY5" fmla="*/ 6082857 h 6096000"/>
+              <a:gd name="connsiteX6" fmla="*/ 0 w 5704117"/>
+              <a:gd name="connsiteY6" fmla="*/ 6078450 h 6096000"/>
+              <a:gd name="connsiteX7" fmla="*/ 91440 w 5704117"/>
+              <a:gd name="connsiteY7" fmla="*/ 91440 h 6096000"/>
+              <a:gd name="connsiteX0" fmla="*/ 4562795 w 5704117"/>
+              <a:gd name="connsiteY0" fmla="*/ 0 h 6096000"/>
+              <a:gd name="connsiteX1" fmla="*/ 4721192 w 5704117"/>
+              <a:gd name="connsiteY1" fmla="*/ 133595 h 6096000"/>
+              <a:gd name="connsiteX2" fmla="*/ 5467522 w 5704117"/>
+              <a:gd name="connsiteY2" fmla="*/ 1054328 h 6096000"/>
+              <a:gd name="connsiteX3" fmla="*/ 5538873 w 5704117"/>
+              <a:gd name="connsiteY3" fmla="*/ 2897564 h 6096000"/>
+              <a:gd name="connsiteX4" fmla="*/ 4442050 w 5704117"/>
+              <a:gd name="connsiteY4" fmla="*/ 4732407 h 6096000"/>
+              <a:gd name="connsiteX5" fmla="*/ 93046 w 5704117"/>
+              <a:gd name="connsiteY5" fmla="*/ 6082857 h 6096000"/>
+              <a:gd name="connsiteX6" fmla="*/ 0 w 5704117"/>
+              <a:gd name="connsiteY6" fmla="*/ 6078450 h 6096000"/>
+            </a:gdLst>
+            <a:ahLst/>
+            <a:cxnLst>
+              <a:cxn ang="0">
+                <a:pos x="connsiteX0" y="connsiteY0"/>
+              </a:cxn>
+              <a:cxn ang="0">
+                <a:pos x="connsiteX1" y="connsiteY1"/>
+              </a:cxn>
+              <a:cxn ang="0">
+                <a:pos x="connsiteX2" y="connsiteY2"/>
+              </a:cxn>
+              <a:cxn ang="0">
+                <a:pos x="connsiteX3" y="connsiteY3"/>
+              </a:cxn>
+              <a:cxn ang="0">
+                <a:pos x="connsiteX4" y="connsiteY4"/>
+              </a:cxn>
+              <a:cxn ang="0">
+                <a:pos x="connsiteX5" y="connsiteY5"/>
+              </a:cxn>
+              <a:cxn ang="0">
+                <a:pos x="connsiteX6" y="connsiteY6"/>
+              </a:cxn>
+            </a:cxnLst>
+            <a:rect l="l" t="t" r="r" b="b"/>
+            <a:pathLst>
+              <a:path w="5704117" h="6096000">
+                <a:moveTo>
+                  <a:pt x="4562795" y="0"/>
+                </a:moveTo>
+                <a:lnTo>
+                  <a:pt x="4721192" y="133595"/>
+                </a:lnTo>
+                <a:cubicBezTo>
+                  <a:pt x="5067135" y="440105"/>
+                  <a:pt x="5309779" y="747048"/>
+                  <a:pt x="5467522" y="1054328"/>
+                </a:cubicBezTo>
+                <a:cubicBezTo>
+                  <a:pt x="5782917" y="1668625"/>
+                  <a:pt x="5758242" y="2283795"/>
+                  <a:pt x="5538873" y="2897564"/>
+                </a:cubicBezTo>
+                <a:cubicBezTo>
+                  <a:pt x="5319500" y="3511334"/>
+                  <a:pt x="4905433" y="4123706"/>
+                  <a:pt x="4442050" y="4732407"/>
+                </a:cubicBezTo>
+                <a:cubicBezTo>
+                  <a:pt x="3499930" y="5970384"/>
+                  <a:pt x="1925433" y="6153690"/>
+                  <a:pt x="93046" y="6082857"/>
+                </a:cubicBezTo>
+                <a:lnTo>
+                  <a:pt x="0" y="6078450"/>
+                </a:lnTo>
+              </a:path>
+            </a:pathLst>
+          </a:custGeom>
+          <a:noFill/>
+          <a:ln w="19050">
+            <a:solidFill>
+              <a:schemeClr val="accent2">
+                <a:lumMod val="60000"/>
+                <a:lumOff val="40000"/>
+              </a:schemeClr>
+            </a:solidFill>
+          </a:ln>
+        </p:spPr>
+        <p:style>
+          <a:lnRef idx="2">
+            <a:schemeClr val="accent1">
+              <a:shade val="50000"/>
+            </a:schemeClr>
+          </a:lnRef>
+          <a:fillRef idx="1">
+            <a:schemeClr val="accent1"/>
+          </a:fillRef>
+          <a:effectRef idx="0">
+            <a:schemeClr val="accent1"/>
+          </a:effectRef>
+          <a:fontRef idx="minor">
+            <a:schemeClr val="lt1"/>
+          </a:fontRef>
+        </p:style>
+        <p:txBody>
+          <a:bodyPr wrap="square" rtlCol="0" anchor="ctr">
+            <a:noAutofit/>
+          </a:bodyPr>
+          <a:lstStyle/>
+          <a:p>
+            <a:pPr algn="ctr"/>
+            <a:endParaRPr lang="en-US">
+              <a:solidFill>
+                <a:prstClr val="white"/>
+              </a:solidFill>
+              <a:latin typeface="Avenir Next LT Pro Light"/>
+            </a:endParaRPr>
+          </a:p>
+        </p:txBody>
+      </p:sp>
+      <p:sp>
+        <p:nvSpPr>
+          <p:cNvPr id="3" name="Content Placeholder 2">
+            <a:extLst>
+              <a:ext uri="{FF2B5EF4-FFF2-40B4-BE49-F238E27FC236}">
+                <a16:creationId xmlns:a16="http://schemas.microsoft.com/office/drawing/2014/main" id="{062688F5-5B22-49C2-8954-56695A4C6FB5}"/>
+              </a:ext>
+            </a:extLst>
+          </p:cNvPr>
+          <p:cNvSpPr>
+            <a:spLocks noGrp="1"/>
+          </p:cNvSpPr>
+          <p:nvPr>
+            <p:ph idx="1"/>
+          </p:nvPr>
+        </p:nvSpPr>
+        <p:spPr>
+          <a:xfrm>
+            <a:off x="762000" y="2286000"/>
+            <a:ext cx="5334000" cy="3810001"/>
+          </a:xfrm>
+        </p:spPr>
+        <p:txBody>
+          <a:bodyPr vert="horz" lIns="91440" tIns="45720" rIns="91440" bIns="45720" rtlCol="0">
+            <a:normAutofit/>
+          </a:bodyPr>
+          <a:lstStyle/>
+          <a:p>
+            <a:pPr marL="0" indent="0">
+              <a:buNone/>
+            </a:pPr>
+            <a:r>
+              <a:rPr lang="en-US" sz="2400"/>
+              <a:t>This process converts words having the similar root meaning into the same root. For example, "go, went, gone" all will be converted to "go"</a:t>
+            </a:r>
+          </a:p>
+        </p:txBody>
+      </p:sp>
+      <p:sp>
+        <p:nvSpPr>
+          <p:cNvPr id="2" name="Title 1">
+            <a:extLst>
+              <a:ext uri="{FF2B5EF4-FFF2-40B4-BE49-F238E27FC236}">
+                <a16:creationId xmlns:a16="http://schemas.microsoft.com/office/drawing/2014/main" id="{11ADDBAF-B1F3-A130-2ADB-177C20DF74BD}"/>
+              </a:ext>
+            </a:extLst>
+          </p:cNvPr>
+          <p:cNvSpPr>
+            <a:spLocks noGrp="1"/>
+          </p:cNvSpPr>
+          <p:nvPr>
+            <p:ph type="title"/>
+          </p:nvPr>
+        </p:nvSpPr>
+        <p:spPr>
+          <a:xfrm>
+            <a:off x="762000" y="762000"/>
+            <a:ext cx="5334000" cy="1524000"/>
+          </a:xfrm>
+        </p:spPr>
+        <p:txBody>
+          <a:bodyPr>
+            <a:normAutofit/>
+          </a:bodyPr>
+          <a:lstStyle/>
+          <a:p>
+            <a:r>
+              <a:rPr lang="en-US" sz="3200"/>
+              <a:t>Lemmatization</a:t>
+            </a:r>
+          </a:p>
+        </p:txBody>
+      </p:sp>
+    </p:spTree>
+    <p:extLst>
+      <p:ext uri="{BB962C8B-B14F-4D97-AF65-F5344CB8AC3E}">
+        <p14:creationId xmlns:p14="http://schemas.microsoft.com/office/powerpoint/2010/main" val="2320955923"/>
+      </p:ext>
+    </p:extLst>
+  </p:cSld>
+  <p:clrMapOvr>
+    <a:masterClrMapping/>
+  </p:clrMapOvr>
+</p:sld>
+</file>
+
+<file path=ppt/slides/slide7.xml><?xml version="1.0" encoding="utf-8"?>
 <p:sld xmlns:a="http://schemas.openxmlformats.org/drawingml/2006/main" xmlns:r="http://schemas.openxmlformats.org/officeDocument/2006/relationships" xmlns:p="http://schemas.openxmlformats.org/presentationml/2006/main">
   <p:cSld>
     <p:bg>
@@ -13669,8 +14839,8 @@
         </p:nvSpPr>
         <p:spPr>
           <a:xfrm>
-            <a:off x="6096000" y="1524000"/>
-            <a:ext cx="5334000" cy="2286000"/>
+            <a:off x="5487464" y="595222"/>
+            <a:ext cx="5657639" cy="1040921"/>
           </a:xfrm>
         </p:spPr>
         <p:txBody>
@@ -13680,7 +14850,7 @@
           <a:lstStyle/>
           <a:p>
             <a:r>
-              <a:rPr lang="en-US" kern="1200">
+              <a:rPr lang="en-US" kern="1200" dirty="0">
                 <a:solidFill>
                   <a:schemeClr val="tx1"/>
                 </a:solidFill>
@@ -13711,8 +14881,8 @@
         </p:nvSpPr>
         <p:spPr>
           <a:xfrm>
-            <a:off x="6095999" y="4571999"/>
-            <a:ext cx="5333999" cy="1524000"/>
+            <a:off x="5487465" y="1961070"/>
+            <a:ext cx="6477374" cy="4698521"/>
           </a:xfrm>
         </p:spPr>
         <p:txBody>
@@ -13725,7 +14895,7 @@
               <a:buNone/>
             </a:pPr>
             <a:r>
-              <a:rPr lang="en-US" sz="2400" kern="1200">
+              <a:rPr lang="en-US" sz="2400" kern="1200" dirty="0">
                 <a:solidFill>
                   <a:schemeClr val="tx1">
                     <a:alpha val="70000"/>
@@ -13735,8 +14905,23 @@
                 <a:ea typeface="+mn-ea"/>
                 <a:cs typeface="+mn-cs"/>
               </a:rPr>
-              <a:t>As text strings are hard to use, the strings are converted to numbers using the TF-IDF vectorizer</a:t>
+              <a:t>As text strings are hard to use, the strings are converted to numbers. Here we are  using the TF-IDF vectorizer.</a:t>
             </a:r>
+          </a:p>
+          <a:p>
+            <a:pPr marL="0" indent="0">
+              <a:buNone/>
+            </a:pPr>
+            <a:endParaRPr lang="en-US" sz="2400" kern="1200" dirty="0">
+              <a:solidFill>
+                <a:schemeClr val="tx1">
+                  <a:alpha val="70000"/>
+                </a:schemeClr>
+              </a:solidFill>
+              <a:latin typeface="+mn-lt"/>
+              <a:ea typeface="+mn-ea"/>
+              <a:cs typeface="+mn-cs"/>
+            </a:endParaRPr>
           </a:p>
         </p:txBody>
       </p:sp>
@@ -14223,6 +15408,85 @@
           </a:p>
         </p:txBody>
       </p:sp>
+      <p:pic>
+        <p:nvPicPr>
+          <p:cNvPr id="5" name="Picture 4">
+            <a:extLst>
+              <a:ext uri="{FF2B5EF4-FFF2-40B4-BE49-F238E27FC236}">
+                <a16:creationId xmlns:a16="http://schemas.microsoft.com/office/drawing/2014/main" id="{26A6DFD8-7391-1D32-8609-42A2556CC259}"/>
+              </a:ext>
+            </a:extLst>
+          </p:cNvPr>
+          <p:cNvPicPr>
+            <a:picLocks noChangeAspect="1"/>
+          </p:cNvPicPr>
+          <p:nvPr/>
+        </p:nvPicPr>
+        <p:blipFill>
+          <a:blip r:embed="rId2">
+            <a:extLst>
+              <a:ext uri="{28A0092B-C50C-407E-A947-70E740481C1C}">
+                <a14:useLocalDpi xmlns:a14="http://schemas.microsoft.com/office/drawing/2010/main" val="0"/>
+              </a:ext>
+            </a:extLst>
+          </a:blip>
+          <a:stretch>
+            <a:fillRect/>
+          </a:stretch>
+        </p:blipFill>
+        <p:spPr>
+          <a:xfrm>
+            <a:off x="5487464" y="3455295"/>
+            <a:ext cx="6140926" cy="1809006"/>
+          </a:xfrm>
+          <a:prstGeom prst="rect">
+            <a:avLst/>
+          </a:prstGeom>
+        </p:spPr>
+      </p:pic>
+      <p:sp>
+        <p:nvSpPr>
+          <p:cNvPr id="6" name="TextBox 5">
+            <a:extLst>
+              <a:ext uri="{FF2B5EF4-FFF2-40B4-BE49-F238E27FC236}">
+                <a16:creationId xmlns:a16="http://schemas.microsoft.com/office/drawing/2014/main" id="{87A72366-1D76-918B-A2B4-5E327E925B31}"/>
+              </a:ext>
+            </a:extLst>
+          </p:cNvPr>
+          <p:cNvSpPr txBox="1"/>
+          <p:nvPr/>
+        </p:nvSpPr>
+        <p:spPr>
+          <a:xfrm>
+            <a:off x="5487464" y="5710687"/>
+            <a:ext cx="6140926" cy="923330"/>
+          </a:xfrm>
+          <a:prstGeom prst="rect">
+            <a:avLst/>
+          </a:prstGeom>
+          <a:noFill/>
+        </p:spPr>
+        <p:txBody>
+          <a:bodyPr wrap="square" rtlCol="0">
+            <a:spAutoFit/>
+          </a:bodyPr>
+          <a:lstStyle/>
+          <a:p>
+            <a:r>
+              <a:rPr lang="en-US" dirty="0"/>
+              <a:t>Where t = a term whose TF-IDF is being calculated, d = a specific document, N is the total number of documents, </a:t>
+            </a:r>
+            <a:r>
+              <a:rPr lang="en-US" dirty="0" err="1"/>
+              <a:t>df</a:t>
+            </a:r>
+            <a:r>
+              <a:rPr lang="en-US" dirty="0"/>
+              <a:t> is the number of documents with the term t.   </a:t>
+            </a:r>
+          </a:p>
+        </p:txBody>
+      </p:sp>
     </p:spTree>
     <p:extLst>
       <p:ext uri="{BB962C8B-B14F-4D97-AF65-F5344CB8AC3E}">
@@ -14236,17 +15500,9 @@
 </p:sld>
 </file>
 
-<file path=ppt/slides/slide7.xml><?xml version="1.0" encoding="utf-8"?>
+<file path=ppt/slides/slide8.xml><?xml version="1.0" encoding="utf-8"?>
 <p:sld xmlns:a="http://schemas.openxmlformats.org/drawingml/2006/main" xmlns:r="http://schemas.openxmlformats.org/officeDocument/2006/relationships" xmlns:p="http://schemas.openxmlformats.org/presentationml/2006/main">
   <p:cSld>
-    <p:bg>
-      <p:bgPr>
-        <a:solidFill>
-          <a:schemeClr val="bg2"/>
-        </a:solidFill>
-        <a:effectLst/>
-      </p:bgPr>
-    </p:bg>
     <p:spTree>
       <p:nvGrpSpPr>
         <p:cNvPr id="1" name=""/>
@@ -14261,338 +15517,32 @@
           <a:chExt cx="0" cy="0"/>
         </a:xfrm>
       </p:grpSpPr>
-      <p:sp useBgFill="1">
+      <p:sp>
         <p:nvSpPr>
-          <p:cNvPr id="9" name="Rectangle 8">
+          <p:cNvPr id="2" name="Title 1">
             <a:extLst>
               <a:ext uri="{FF2B5EF4-FFF2-40B4-BE49-F238E27FC236}">
-                <a16:creationId xmlns:a16="http://schemas.microsoft.com/office/drawing/2014/main" id="{987A0FBA-CC04-4256-A8EB-BB3C543E989C}"/>
-              </a:ext>
-              <a:ext uri="{C183D7F6-B498-43B3-948B-1728B52AA6E4}">
-                <adec:decorative xmlns:adec="http://schemas.microsoft.com/office/drawing/2017/decorative" val="1"/>
+                <a16:creationId xmlns:a16="http://schemas.microsoft.com/office/drawing/2014/main" id="{D9D850DA-2AEF-CB7A-C54C-278FB2DA9771}"/>
               </a:ext>
             </a:extLst>
           </p:cNvPr>
           <p:cNvSpPr>
-            <a:spLocks noGrp="1" noRot="1" noChangeAspect="1" noMove="1" noResize="1" noEditPoints="1" noAdjustHandles="1" noChangeArrowheads="1" noChangeShapeType="1" noTextEdit="1"/>
+            <a:spLocks noGrp="1"/>
           </p:cNvSpPr>
           <p:nvPr>
-            <p:extLst>
-              <p:ext uri="{386F3935-93C4-4BCD-93E2-E3B085C9AB24}">
-                <p16:designElem xmlns:p16="http://schemas.microsoft.com/office/powerpoint/2015/main" val="1"/>
-              </p:ext>
-            </p:extLst>
+            <p:ph type="title"/>
           </p:nvPr>
         </p:nvSpPr>
-        <p:spPr>
-          <a:xfrm>
-            <a:off x="0" y="0"/>
-            <a:ext cx="12192000" cy="6858000"/>
-          </a:xfrm>
-          <a:prstGeom prst="rect">
-            <a:avLst/>
-          </a:prstGeom>
-          <a:ln w="12700" cap="flat" cmpd="sng" algn="ctr">
-            <a:noFill/>
-            <a:prstDash val="solid"/>
-            <a:miter lim="800000"/>
-          </a:ln>
-          <a:effectLst/>
-          <a:extLst>
-            <a:ext uri="{91240B29-F687-4F45-9708-019B960494DF}">
-              <a14:hiddenLine xmlns:a14="http://schemas.microsoft.com/office/drawing/2010/main" w="12700" cap="flat" cmpd="sng" algn="ctr">
-                <a:solidFill>
-                  <a:schemeClr val="accent1">
-                    <a:shade val="50000"/>
-                  </a:schemeClr>
-                </a:solidFill>
-                <a:prstDash val="solid"/>
-                <a:miter lim="800000"/>
-              </a14:hiddenLine>
-            </a:ext>
-          </a:extLst>
-        </p:spPr>
-        <p:style>
-          <a:lnRef idx="2">
-            <a:schemeClr val="accent1">
-              <a:shade val="50000"/>
-            </a:schemeClr>
-          </a:lnRef>
-          <a:fillRef idx="1">
-            <a:schemeClr val="accent1"/>
-          </a:fillRef>
-          <a:effectRef idx="0">
-            <a:schemeClr val="accent1"/>
-          </a:effectRef>
-          <a:fontRef idx="minor">
-            <a:schemeClr val="lt1"/>
-          </a:fontRef>
-        </p:style>
+        <p:spPr/>
         <p:txBody>
-          <a:bodyPr rtlCol="0" anchor="ctr"/>
+          <a:bodyPr/>
           <a:lstStyle/>
           <a:p>
-            <a:pPr algn="ctr"/>
-            <a:endParaRPr lang="en-US"/>
-          </a:p>
-        </p:txBody>
-      </p:sp>
-      <p:pic>
-        <p:nvPicPr>
-          <p:cNvPr id="5" name="Picture 4" descr="Plant and roots">
-            <a:extLst>
-              <a:ext uri="{FF2B5EF4-FFF2-40B4-BE49-F238E27FC236}">
-                <a16:creationId xmlns:a16="http://schemas.microsoft.com/office/drawing/2014/main" id="{267B69F5-DBB5-F5B9-46CA-CA212257D10E}"/>
-              </a:ext>
-            </a:extLst>
-          </p:cNvPr>
-          <p:cNvPicPr>
-            <a:picLocks noChangeAspect="1"/>
-          </p:cNvPicPr>
-          <p:nvPr/>
-        </p:nvPicPr>
-        <p:blipFill rotWithShape="1">
-          <a:blip r:embed="rId2"/>
-          <a:srcRect l="835" r="10376" b="6"/>
-          <a:stretch/>
-        </p:blipFill>
-        <p:spPr>
-          <a:xfrm>
-            <a:off x="6613174" y="10"/>
-            <a:ext cx="5578824" cy="6028246"/>
-          </a:xfrm>
-          <a:custGeom>
-            <a:avLst/>
-            <a:gdLst/>
-            <a:ahLst/>
-            <a:cxnLst/>
-            <a:rect l="l" t="t" r="r" b="b"/>
-            <a:pathLst>
-              <a:path w="5578824" h="6028256">
-                <a:moveTo>
-                  <a:pt x="1681218" y="0"/>
-                </a:moveTo>
-                <a:lnTo>
-                  <a:pt x="5578824" y="0"/>
-                </a:lnTo>
-                <a:lnTo>
-                  <a:pt x="5578824" y="5760161"/>
-                </a:lnTo>
-                <a:lnTo>
-                  <a:pt x="5441231" y="5804042"/>
-                </a:lnTo>
-                <a:cubicBezTo>
-                  <a:pt x="5079089" y="5907589"/>
-                  <a:pt x="4674877" y="5944442"/>
-                  <a:pt x="4253224" y="5980388"/>
-                </a:cubicBezTo>
-                <a:cubicBezTo>
-                  <a:pt x="2813852" y="6102970"/>
-                  <a:pt x="1551586" y="6071494"/>
-                  <a:pt x="837278" y="4877588"/>
-                </a:cubicBezTo>
-                <a:cubicBezTo>
-                  <a:pt x="529862" y="4363935"/>
-                  <a:pt x="255162" y="3847185"/>
-                  <a:pt x="109626" y="3329255"/>
-                </a:cubicBezTo>
-                <a:cubicBezTo>
-                  <a:pt x="-35907" y="2811325"/>
-                  <a:pt x="-52277" y="2292214"/>
-                  <a:pt x="156962" y="1773839"/>
-                </a:cubicBezTo>
-                <a:cubicBezTo>
-                  <a:pt x="296494" y="1428108"/>
-                  <a:pt x="536161" y="1082881"/>
-                  <a:pt x="904890" y="738354"/>
-                </a:cubicBezTo>
-                <a:cubicBezTo>
-                  <a:pt x="1036690" y="615181"/>
-                  <a:pt x="1169968" y="488910"/>
-                  <a:pt x="1304592" y="360545"/>
-                </a:cubicBezTo>
-                <a:close/>
-              </a:path>
-            </a:pathLst>
-          </a:custGeom>
-        </p:spPr>
-      </p:pic>
-      <p:sp>
-        <p:nvSpPr>
-          <p:cNvPr id="11" name="Freeform: Shape 10">
-            <a:extLst>
-              <a:ext uri="{FF2B5EF4-FFF2-40B4-BE49-F238E27FC236}">
-                <a16:creationId xmlns:a16="http://schemas.microsoft.com/office/drawing/2014/main" id="{3362A0EA-3E81-4464-94B8-70BE5870EDC0}"/>
-              </a:ext>
-              <a:ext uri="{C183D7F6-B498-43B3-948B-1728B52AA6E4}">
-                <adec:decorative xmlns:adec="http://schemas.microsoft.com/office/drawing/2017/decorative" val="1"/>
-              </a:ext>
-            </a:extLst>
-          </p:cNvPr>
-          <p:cNvSpPr>
-            <a:spLocks noGrp="1" noRot="1" noChangeAspect="1" noMove="1" noResize="1" noEditPoints="1" noAdjustHandles="1" noChangeArrowheads="1" noChangeShapeType="1" noTextEdit="1"/>
-          </p:cNvSpPr>
-          <p:nvPr>
-            <p:extLst>
-              <p:ext uri="{386F3935-93C4-4BCD-93E2-E3B085C9AB24}">
-                <p16:designElem xmlns:p16="http://schemas.microsoft.com/office/powerpoint/2015/main" val="1"/>
-              </p:ext>
-            </p:extLst>
-          </p:nvPr>
-        </p:nvSpPr>
-        <p:spPr>
-          <a:xfrm flipH="1">
-            <a:off x="6487883" y="0"/>
-            <a:ext cx="5704117" cy="6096000"/>
-          </a:xfrm>
-          <a:custGeom>
-            <a:avLst/>
-            <a:gdLst>
-              <a:gd name="connsiteX0" fmla="*/ 0 w 5704117"/>
-              <a:gd name="connsiteY0" fmla="*/ 0 h 6096000"/>
-              <a:gd name="connsiteX1" fmla="*/ 4562795 w 5704117"/>
-              <a:gd name="connsiteY1" fmla="*/ 0 h 6096000"/>
-              <a:gd name="connsiteX2" fmla="*/ 4721192 w 5704117"/>
-              <a:gd name="connsiteY2" fmla="*/ 133595 h 6096000"/>
-              <a:gd name="connsiteX3" fmla="*/ 5467522 w 5704117"/>
-              <a:gd name="connsiteY3" fmla="*/ 1054328 h 6096000"/>
-              <a:gd name="connsiteX4" fmla="*/ 5538873 w 5704117"/>
-              <a:gd name="connsiteY4" fmla="*/ 2897564 h 6096000"/>
-              <a:gd name="connsiteX5" fmla="*/ 4442050 w 5704117"/>
-              <a:gd name="connsiteY5" fmla="*/ 4732407 h 6096000"/>
-              <a:gd name="connsiteX6" fmla="*/ 93046 w 5704117"/>
-              <a:gd name="connsiteY6" fmla="*/ 6082857 h 6096000"/>
-              <a:gd name="connsiteX7" fmla="*/ 0 w 5704117"/>
-              <a:gd name="connsiteY7" fmla="*/ 6078450 h 6096000"/>
-              <a:gd name="connsiteX0" fmla="*/ 4562795 w 5704117"/>
-              <a:gd name="connsiteY0" fmla="*/ 0 h 6096000"/>
-              <a:gd name="connsiteX1" fmla="*/ 4721192 w 5704117"/>
-              <a:gd name="connsiteY1" fmla="*/ 133595 h 6096000"/>
-              <a:gd name="connsiteX2" fmla="*/ 5467522 w 5704117"/>
-              <a:gd name="connsiteY2" fmla="*/ 1054328 h 6096000"/>
-              <a:gd name="connsiteX3" fmla="*/ 5538873 w 5704117"/>
-              <a:gd name="connsiteY3" fmla="*/ 2897564 h 6096000"/>
-              <a:gd name="connsiteX4" fmla="*/ 4442050 w 5704117"/>
-              <a:gd name="connsiteY4" fmla="*/ 4732407 h 6096000"/>
-              <a:gd name="connsiteX5" fmla="*/ 93046 w 5704117"/>
-              <a:gd name="connsiteY5" fmla="*/ 6082857 h 6096000"/>
-              <a:gd name="connsiteX6" fmla="*/ 0 w 5704117"/>
-              <a:gd name="connsiteY6" fmla="*/ 6078450 h 6096000"/>
-              <a:gd name="connsiteX7" fmla="*/ 91440 w 5704117"/>
-              <a:gd name="connsiteY7" fmla="*/ 91440 h 6096000"/>
-              <a:gd name="connsiteX0" fmla="*/ 4562795 w 5704117"/>
-              <a:gd name="connsiteY0" fmla="*/ 0 h 6096000"/>
-              <a:gd name="connsiteX1" fmla="*/ 4721192 w 5704117"/>
-              <a:gd name="connsiteY1" fmla="*/ 133595 h 6096000"/>
-              <a:gd name="connsiteX2" fmla="*/ 5467522 w 5704117"/>
-              <a:gd name="connsiteY2" fmla="*/ 1054328 h 6096000"/>
-              <a:gd name="connsiteX3" fmla="*/ 5538873 w 5704117"/>
-              <a:gd name="connsiteY3" fmla="*/ 2897564 h 6096000"/>
-              <a:gd name="connsiteX4" fmla="*/ 4442050 w 5704117"/>
-              <a:gd name="connsiteY4" fmla="*/ 4732407 h 6096000"/>
-              <a:gd name="connsiteX5" fmla="*/ 93046 w 5704117"/>
-              <a:gd name="connsiteY5" fmla="*/ 6082857 h 6096000"/>
-              <a:gd name="connsiteX6" fmla="*/ 0 w 5704117"/>
-              <a:gd name="connsiteY6" fmla="*/ 6078450 h 6096000"/>
-            </a:gdLst>
-            <a:ahLst/>
-            <a:cxnLst>
-              <a:cxn ang="0">
-                <a:pos x="connsiteX0" y="connsiteY0"/>
-              </a:cxn>
-              <a:cxn ang="0">
-                <a:pos x="connsiteX1" y="connsiteY1"/>
-              </a:cxn>
-              <a:cxn ang="0">
-                <a:pos x="connsiteX2" y="connsiteY2"/>
-              </a:cxn>
-              <a:cxn ang="0">
-                <a:pos x="connsiteX3" y="connsiteY3"/>
-              </a:cxn>
-              <a:cxn ang="0">
-                <a:pos x="connsiteX4" y="connsiteY4"/>
-              </a:cxn>
-              <a:cxn ang="0">
-                <a:pos x="connsiteX5" y="connsiteY5"/>
-              </a:cxn>
-              <a:cxn ang="0">
-                <a:pos x="connsiteX6" y="connsiteY6"/>
-              </a:cxn>
-            </a:cxnLst>
-            <a:rect l="l" t="t" r="r" b="b"/>
-            <a:pathLst>
-              <a:path w="5704117" h="6096000">
-                <a:moveTo>
-                  <a:pt x="4562795" y="0"/>
-                </a:moveTo>
-                <a:lnTo>
-                  <a:pt x="4721192" y="133595"/>
-                </a:lnTo>
-                <a:cubicBezTo>
-                  <a:pt x="5067135" y="440105"/>
-                  <a:pt x="5309779" y="747048"/>
-                  <a:pt x="5467522" y="1054328"/>
-                </a:cubicBezTo>
-                <a:cubicBezTo>
-                  <a:pt x="5782917" y="1668625"/>
-                  <a:pt x="5758242" y="2283795"/>
-                  <a:pt x="5538873" y="2897564"/>
-                </a:cubicBezTo>
-                <a:cubicBezTo>
-                  <a:pt x="5319500" y="3511334"/>
-                  <a:pt x="4905433" y="4123706"/>
-                  <a:pt x="4442050" y="4732407"/>
-                </a:cubicBezTo>
-                <a:cubicBezTo>
-                  <a:pt x="3499930" y="5970384"/>
-                  <a:pt x="1925433" y="6153690"/>
-                  <a:pt x="93046" y="6082857"/>
-                </a:cubicBezTo>
-                <a:lnTo>
-                  <a:pt x="0" y="6078450"/>
-                </a:lnTo>
-              </a:path>
-            </a:pathLst>
-          </a:custGeom>
-          <a:noFill/>
-          <a:ln w="19050">
-            <a:solidFill>
-              <a:schemeClr val="accent2">
-                <a:lumMod val="60000"/>
-                <a:lumOff val="40000"/>
-              </a:schemeClr>
-            </a:solidFill>
-          </a:ln>
-        </p:spPr>
-        <p:style>
-          <a:lnRef idx="2">
-            <a:schemeClr val="accent1">
-              <a:shade val="50000"/>
-            </a:schemeClr>
-          </a:lnRef>
-          <a:fillRef idx="1">
-            <a:schemeClr val="accent1"/>
-          </a:fillRef>
-          <a:effectRef idx="0">
-            <a:schemeClr val="accent1"/>
-          </a:effectRef>
-          <a:fontRef idx="minor">
-            <a:schemeClr val="lt1"/>
-          </a:fontRef>
-        </p:style>
-        <p:txBody>
-          <a:bodyPr wrap="square" rtlCol="0" anchor="ctr">
-            <a:noAutofit/>
-          </a:bodyPr>
-          <a:lstStyle/>
-          <a:p>
-            <a:pPr algn="ctr"/>
-            <a:endParaRPr lang="en-US">
-              <a:solidFill>
-                <a:prstClr val="white"/>
-              </a:solidFill>
-              <a:latin typeface="Avenir Next LT Pro Light"/>
-            </a:endParaRPr>
+            <a:r>
+              <a:rPr lang="en-US" dirty="0"/>
+              <a:t>Train –test split</a:t>
+            </a:r>
+            <a:endParaRPr lang="en-IN" dirty="0"/>
           </a:p>
         </p:txBody>
       </p:sp>
@@ -14601,7 +15551,7 @@
           <p:cNvPr id="3" name="Content Placeholder 2">
             <a:extLst>
               <a:ext uri="{FF2B5EF4-FFF2-40B4-BE49-F238E27FC236}">
-                <a16:creationId xmlns:a16="http://schemas.microsoft.com/office/drawing/2014/main" id="{062688F5-5B22-49C2-8954-56695A4C6FB5}"/>
+                <a16:creationId xmlns:a16="http://schemas.microsoft.com/office/drawing/2014/main" id="{B1A3A94E-B895-D6C9-8060-21F03FC3C783}"/>
               </a:ext>
             </a:extLst>
           </p:cNvPr>
@@ -14612,67 +15562,53 @@
             <p:ph idx="1"/>
           </p:nvPr>
         </p:nvSpPr>
-        <p:spPr>
-          <a:xfrm>
-            <a:off x="762000" y="2286000"/>
-            <a:ext cx="5334000" cy="3810001"/>
-          </a:xfrm>
-        </p:spPr>
+        <p:spPr/>
         <p:txBody>
-          <a:bodyPr vert="horz" lIns="91440" tIns="45720" rIns="91440" bIns="45720" rtlCol="0">
-            <a:normAutofit/>
-          </a:bodyPr>
+          <a:bodyPr/>
           <a:lstStyle/>
           <a:p>
-            <a:pPr marL="0" indent="0">
-              <a:buNone/>
-            </a:pPr>
             <a:r>
-              <a:rPr lang="en-US" sz="2400"/>
-              <a:t>This process converts words having the similar root meaning into the same root. For example, "go, went, gone" all will be converted to "go"</a:t>
+              <a:rPr lang="en-US" dirty="0"/>
+              <a:t>We used </a:t>
             </a:r>
-          </a:p>
-        </p:txBody>
-      </p:sp>
-      <p:sp>
-        <p:nvSpPr>
-          <p:cNvPr id="2" name="Title 1">
-            <a:extLst>
-              <a:ext uri="{FF2B5EF4-FFF2-40B4-BE49-F238E27FC236}">
-                <a16:creationId xmlns:a16="http://schemas.microsoft.com/office/drawing/2014/main" id="{11ADDBAF-B1F3-A130-2ADB-177C20DF74BD}"/>
-              </a:ext>
-            </a:extLst>
-          </p:cNvPr>
-          <p:cNvSpPr>
-            <a:spLocks noGrp="1"/>
-          </p:cNvSpPr>
-          <p:nvPr>
-            <p:ph type="title"/>
-          </p:nvPr>
-        </p:nvSpPr>
-        <p:spPr>
-          <a:xfrm>
-            <a:off x="762000" y="762000"/>
-            <a:ext cx="5334000" cy="1524000"/>
-          </a:xfrm>
-        </p:spPr>
-        <p:txBody>
-          <a:bodyPr>
-            <a:normAutofit/>
-          </a:bodyPr>
-          <a:lstStyle/>
-          <a:p>
             <a:r>
-              <a:rPr lang="en-US" sz="3200"/>
-              <a:t>Lemmatization</a:t>
+              <a:rPr lang="en-US" dirty="0" err="1"/>
+              <a:t>train_test_split</a:t>
             </a:r>
+            <a:r>
+              <a:rPr lang="en-US" dirty="0"/>
+              <a:t> of </a:t>
+            </a:r>
+            <a:r>
+              <a:rPr lang="en-US" dirty="0" err="1"/>
+              <a:t>sklearn</a:t>
+            </a:r>
+            <a:r>
+              <a:rPr lang="en-US" dirty="0"/>
+              <a:t> library to split our dataset into training and testing dataset so that we take care to not overfit the dataset with any model.</a:t>
+            </a:r>
+          </a:p>
+          <a:p>
+            <a:r>
+              <a:rPr lang="en-US" dirty="0"/>
+              <a:t>Here we have split the dataset in the proportion </a:t>
+            </a:r>
+            <a:r>
+              <a:rPr lang="en-US" dirty="0" err="1"/>
+              <a:t>train:test</a:t>
+            </a:r>
+            <a:r>
+              <a:rPr lang="en-US"/>
+              <a:t>:: 0.7:0.3</a:t>
+            </a:r>
+            <a:endParaRPr lang="en-US" dirty="0"/>
           </a:p>
         </p:txBody>
       </p:sp>
     </p:spTree>
     <p:extLst>
       <p:ext uri="{BB962C8B-B14F-4D97-AF65-F5344CB8AC3E}">
-        <p14:creationId xmlns:p14="http://schemas.microsoft.com/office/powerpoint/2010/main" val="2320955923"/>
+        <p14:creationId xmlns:p14="http://schemas.microsoft.com/office/powerpoint/2010/main" val="3811556430"/>
       </p:ext>
     </p:extLst>
   </p:cSld>
@@ -14682,17 +15618,9 @@
 </p:sld>
 </file>
 
-<file path=ppt/slides/slide8.xml><?xml version="1.0" encoding="utf-8"?>
+<file path=ppt/slides/slide9.xml><?xml version="1.0" encoding="utf-8"?>
 <p:sld xmlns:a="http://schemas.openxmlformats.org/drawingml/2006/main" xmlns:r="http://schemas.openxmlformats.org/officeDocument/2006/relationships" xmlns:p="http://schemas.openxmlformats.org/presentationml/2006/main">
   <p:cSld>
-    <p:bg>
-      <p:bgPr>
-        <a:solidFill>
-          <a:schemeClr val="bg2"/>
-        </a:solidFill>
-        <a:effectLst/>
-      </p:bgPr>
-    </p:bg>
     <p:spTree>
       <p:nvGrpSpPr>
         <p:cNvPr id="1" name=""/>
@@ -14707,394 +15635,12 @@
           <a:chExt cx="0" cy="0"/>
         </a:xfrm>
       </p:grpSpPr>
-      <p:sp useBgFill="1">
-        <p:nvSpPr>
-          <p:cNvPr id="23" name="Rectangle 22">
-            <a:extLst>
-              <a:ext uri="{FF2B5EF4-FFF2-40B4-BE49-F238E27FC236}">
-                <a16:creationId xmlns:a16="http://schemas.microsoft.com/office/drawing/2014/main" id="{987A0FBA-CC04-4256-A8EB-BB3C543E989C}"/>
-              </a:ext>
-              <a:ext uri="{C183D7F6-B498-43B3-948B-1728B52AA6E4}">
-                <adec:decorative xmlns:adec="http://schemas.microsoft.com/office/drawing/2017/decorative" val="1"/>
-              </a:ext>
-            </a:extLst>
-          </p:cNvPr>
-          <p:cNvSpPr>
-            <a:spLocks noGrp="1" noRot="1" noChangeAspect="1" noMove="1" noResize="1" noEditPoints="1" noAdjustHandles="1" noChangeArrowheads="1" noChangeShapeType="1" noTextEdit="1"/>
-          </p:cNvSpPr>
-          <p:nvPr>
-            <p:extLst>
-              <p:ext uri="{386F3935-93C4-4BCD-93E2-E3B085C9AB24}">
-                <p16:designElem xmlns:p16="http://schemas.microsoft.com/office/powerpoint/2015/main" val="1"/>
-              </p:ext>
-            </p:extLst>
-          </p:nvPr>
-        </p:nvSpPr>
-        <p:spPr>
-          <a:xfrm>
-            <a:off x="0" y="0"/>
-            <a:ext cx="12192000" cy="6858000"/>
-          </a:xfrm>
-          <a:prstGeom prst="rect">
-            <a:avLst/>
-          </a:prstGeom>
-          <a:ln w="12700" cap="flat" cmpd="sng" algn="ctr">
-            <a:noFill/>
-            <a:prstDash val="solid"/>
-            <a:miter lim="800000"/>
-          </a:ln>
-          <a:effectLst/>
-          <a:extLst>
-            <a:ext uri="{91240B29-F687-4F45-9708-019B960494DF}">
-              <a14:hiddenLine xmlns:a14="http://schemas.microsoft.com/office/drawing/2010/main" w="12700" cap="flat" cmpd="sng" algn="ctr">
-                <a:solidFill>
-                  <a:schemeClr val="accent1">
-                    <a:shade val="50000"/>
-                  </a:schemeClr>
-                </a:solidFill>
-                <a:prstDash val="solid"/>
-                <a:miter lim="800000"/>
-              </a14:hiddenLine>
-            </a:ext>
-          </a:extLst>
-        </p:spPr>
-        <p:style>
-          <a:lnRef idx="2">
-            <a:schemeClr val="accent1">
-              <a:shade val="50000"/>
-            </a:schemeClr>
-          </a:lnRef>
-          <a:fillRef idx="1">
-            <a:schemeClr val="accent1"/>
-          </a:fillRef>
-          <a:effectRef idx="0">
-            <a:schemeClr val="accent1"/>
-          </a:effectRef>
-          <a:fontRef idx="minor">
-            <a:schemeClr val="lt1"/>
-          </a:fontRef>
-        </p:style>
-        <p:txBody>
-          <a:bodyPr rtlCol="0" anchor="ctr"/>
-          <a:lstStyle/>
-          <a:p>
-            <a:pPr algn="ctr"/>
-            <a:endParaRPr lang="en-US"/>
-          </a:p>
-        </p:txBody>
-      </p:sp>
-      <p:pic>
-        <p:nvPicPr>
-          <p:cNvPr id="5" name="Picture 4" descr="Colourful pins linked with threads">
-            <a:extLst>
-              <a:ext uri="{FF2B5EF4-FFF2-40B4-BE49-F238E27FC236}">
-                <a16:creationId xmlns:a16="http://schemas.microsoft.com/office/drawing/2014/main" id="{5A9E7762-5301-93B0-E5B5-0710D39F1BAC}"/>
-              </a:ext>
-            </a:extLst>
-          </p:cNvPr>
-          <p:cNvPicPr>
-            <a:picLocks noChangeAspect="1"/>
-          </p:cNvPicPr>
-          <p:nvPr/>
-        </p:nvPicPr>
-        <p:blipFill rotWithShape="1">
-          <a:blip r:embed="rId2"/>
-          <a:srcRect l="21764" r="16695" b="2"/>
-          <a:stretch/>
-        </p:blipFill>
-        <p:spPr>
-          <a:xfrm>
-            <a:off x="2" y="10"/>
-            <a:ext cx="5578823" cy="6028246"/>
-          </a:xfrm>
-          <a:custGeom>
-            <a:avLst/>
-            <a:gdLst/>
-            <a:ahLst/>
-            <a:cxnLst/>
-            <a:rect l="l" t="t" r="r" b="b"/>
-            <a:pathLst>
-              <a:path w="5578823" h="6028256">
-                <a:moveTo>
-                  <a:pt x="0" y="0"/>
-                </a:moveTo>
-                <a:lnTo>
-                  <a:pt x="3897606" y="0"/>
-                </a:lnTo>
-                <a:lnTo>
-                  <a:pt x="4274232" y="360545"/>
-                </a:lnTo>
-                <a:cubicBezTo>
-                  <a:pt x="4408856" y="488910"/>
-                  <a:pt x="4542134" y="615181"/>
-                  <a:pt x="4673934" y="738354"/>
-                </a:cubicBezTo>
-                <a:cubicBezTo>
-                  <a:pt x="5042663" y="1082881"/>
-                  <a:pt x="5282330" y="1428108"/>
-                  <a:pt x="5421862" y="1773839"/>
-                </a:cubicBezTo>
-                <a:cubicBezTo>
-                  <a:pt x="5631101" y="2292214"/>
-                  <a:pt x="5614731" y="2811325"/>
-                  <a:pt x="5469198" y="3329255"/>
-                </a:cubicBezTo>
-                <a:cubicBezTo>
-                  <a:pt x="5323662" y="3847185"/>
-                  <a:pt x="5048962" y="4363935"/>
-                  <a:pt x="4741546" y="4877588"/>
-                </a:cubicBezTo>
-                <a:cubicBezTo>
-                  <a:pt x="4027238" y="6071494"/>
-                  <a:pt x="2764972" y="6102970"/>
-                  <a:pt x="1325600" y="5980388"/>
-                </a:cubicBezTo>
-                <a:cubicBezTo>
-                  <a:pt x="903947" y="5944442"/>
-                  <a:pt x="499735" y="5907589"/>
-                  <a:pt x="137593" y="5804042"/>
-                </a:cubicBezTo>
-                <a:lnTo>
-                  <a:pt x="0" y="5760161"/>
-                </a:lnTo>
-                <a:close/>
-              </a:path>
-            </a:pathLst>
-          </a:custGeom>
-        </p:spPr>
-      </p:pic>
-      <p:sp>
-        <p:nvSpPr>
-          <p:cNvPr id="25" name="Freeform: Shape 24">
-            <a:extLst>
-              <a:ext uri="{FF2B5EF4-FFF2-40B4-BE49-F238E27FC236}">
-                <a16:creationId xmlns:a16="http://schemas.microsoft.com/office/drawing/2014/main" id="{E633B38B-B87A-4288-A20F-0223A6C27A5A}"/>
-              </a:ext>
-              <a:ext uri="{C183D7F6-B498-43B3-948B-1728B52AA6E4}">
-                <adec:decorative xmlns:adec="http://schemas.microsoft.com/office/drawing/2017/decorative" val="1"/>
-              </a:ext>
-            </a:extLst>
-          </p:cNvPr>
-          <p:cNvSpPr>
-            <a:spLocks noGrp="1" noRot="1" noChangeAspect="1" noMove="1" noResize="1" noEditPoints="1" noAdjustHandles="1" noChangeArrowheads="1" noChangeShapeType="1" noTextEdit="1"/>
-          </p:cNvSpPr>
-          <p:nvPr>
-            <p:extLst>
-              <p:ext uri="{386F3935-93C4-4BCD-93E2-E3B085C9AB24}">
-                <p16:designElem xmlns:p16="http://schemas.microsoft.com/office/powerpoint/2015/main" val="1"/>
-              </p:ext>
-            </p:extLst>
-          </p:nvPr>
-        </p:nvSpPr>
-        <p:spPr>
-          <a:xfrm>
-            <a:off x="-1" y="0"/>
-            <a:ext cx="5704117" cy="6096000"/>
-          </a:xfrm>
-          <a:custGeom>
-            <a:avLst/>
-            <a:gdLst>
-              <a:gd name="connsiteX0" fmla="*/ 0 w 5704117"/>
-              <a:gd name="connsiteY0" fmla="*/ 0 h 6096000"/>
-              <a:gd name="connsiteX1" fmla="*/ 4562795 w 5704117"/>
-              <a:gd name="connsiteY1" fmla="*/ 0 h 6096000"/>
-              <a:gd name="connsiteX2" fmla="*/ 4721192 w 5704117"/>
-              <a:gd name="connsiteY2" fmla="*/ 133595 h 6096000"/>
-              <a:gd name="connsiteX3" fmla="*/ 5467522 w 5704117"/>
-              <a:gd name="connsiteY3" fmla="*/ 1054328 h 6096000"/>
-              <a:gd name="connsiteX4" fmla="*/ 5538873 w 5704117"/>
-              <a:gd name="connsiteY4" fmla="*/ 2897564 h 6096000"/>
-              <a:gd name="connsiteX5" fmla="*/ 4442050 w 5704117"/>
-              <a:gd name="connsiteY5" fmla="*/ 4732407 h 6096000"/>
-              <a:gd name="connsiteX6" fmla="*/ 93046 w 5704117"/>
-              <a:gd name="connsiteY6" fmla="*/ 6082857 h 6096000"/>
-              <a:gd name="connsiteX7" fmla="*/ 0 w 5704117"/>
-              <a:gd name="connsiteY7" fmla="*/ 6078450 h 6096000"/>
-              <a:gd name="connsiteX0" fmla="*/ 4562795 w 5704117"/>
-              <a:gd name="connsiteY0" fmla="*/ 0 h 6096000"/>
-              <a:gd name="connsiteX1" fmla="*/ 4721192 w 5704117"/>
-              <a:gd name="connsiteY1" fmla="*/ 133595 h 6096000"/>
-              <a:gd name="connsiteX2" fmla="*/ 5467522 w 5704117"/>
-              <a:gd name="connsiteY2" fmla="*/ 1054328 h 6096000"/>
-              <a:gd name="connsiteX3" fmla="*/ 5538873 w 5704117"/>
-              <a:gd name="connsiteY3" fmla="*/ 2897564 h 6096000"/>
-              <a:gd name="connsiteX4" fmla="*/ 4442050 w 5704117"/>
-              <a:gd name="connsiteY4" fmla="*/ 4732407 h 6096000"/>
-              <a:gd name="connsiteX5" fmla="*/ 93046 w 5704117"/>
-              <a:gd name="connsiteY5" fmla="*/ 6082857 h 6096000"/>
-              <a:gd name="connsiteX6" fmla="*/ 0 w 5704117"/>
-              <a:gd name="connsiteY6" fmla="*/ 6078450 h 6096000"/>
-              <a:gd name="connsiteX7" fmla="*/ 91440 w 5704117"/>
-              <a:gd name="connsiteY7" fmla="*/ 91440 h 6096000"/>
-              <a:gd name="connsiteX0" fmla="*/ 4562795 w 5704117"/>
-              <a:gd name="connsiteY0" fmla="*/ 0 h 6096000"/>
-              <a:gd name="connsiteX1" fmla="*/ 4721192 w 5704117"/>
-              <a:gd name="connsiteY1" fmla="*/ 133595 h 6096000"/>
-              <a:gd name="connsiteX2" fmla="*/ 5467522 w 5704117"/>
-              <a:gd name="connsiteY2" fmla="*/ 1054328 h 6096000"/>
-              <a:gd name="connsiteX3" fmla="*/ 5538873 w 5704117"/>
-              <a:gd name="connsiteY3" fmla="*/ 2897564 h 6096000"/>
-              <a:gd name="connsiteX4" fmla="*/ 4442050 w 5704117"/>
-              <a:gd name="connsiteY4" fmla="*/ 4732407 h 6096000"/>
-              <a:gd name="connsiteX5" fmla="*/ 93046 w 5704117"/>
-              <a:gd name="connsiteY5" fmla="*/ 6082857 h 6096000"/>
-              <a:gd name="connsiteX6" fmla="*/ 0 w 5704117"/>
-              <a:gd name="connsiteY6" fmla="*/ 6078450 h 6096000"/>
-            </a:gdLst>
-            <a:ahLst/>
-            <a:cxnLst>
-              <a:cxn ang="0">
-                <a:pos x="connsiteX0" y="connsiteY0"/>
-              </a:cxn>
-              <a:cxn ang="0">
-                <a:pos x="connsiteX1" y="connsiteY1"/>
-              </a:cxn>
-              <a:cxn ang="0">
-                <a:pos x="connsiteX2" y="connsiteY2"/>
-              </a:cxn>
-              <a:cxn ang="0">
-                <a:pos x="connsiteX3" y="connsiteY3"/>
-              </a:cxn>
-              <a:cxn ang="0">
-                <a:pos x="connsiteX4" y="connsiteY4"/>
-              </a:cxn>
-              <a:cxn ang="0">
-                <a:pos x="connsiteX5" y="connsiteY5"/>
-              </a:cxn>
-              <a:cxn ang="0">
-                <a:pos x="connsiteX6" y="connsiteY6"/>
-              </a:cxn>
-            </a:cxnLst>
-            <a:rect l="l" t="t" r="r" b="b"/>
-            <a:pathLst>
-              <a:path w="5704117" h="6096000">
-                <a:moveTo>
-                  <a:pt x="4562795" y="0"/>
-                </a:moveTo>
-                <a:lnTo>
-                  <a:pt x="4721192" y="133595"/>
-                </a:lnTo>
-                <a:cubicBezTo>
-                  <a:pt x="5067135" y="440105"/>
-                  <a:pt x="5309779" y="747048"/>
-                  <a:pt x="5467522" y="1054328"/>
-                </a:cubicBezTo>
-                <a:cubicBezTo>
-                  <a:pt x="5782917" y="1668625"/>
-                  <a:pt x="5758242" y="2283795"/>
-                  <a:pt x="5538873" y="2897564"/>
-                </a:cubicBezTo>
-                <a:cubicBezTo>
-                  <a:pt x="5319500" y="3511334"/>
-                  <a:pt x="4905433" y="4123706"/>
-                  <a:pt x="4442050" y="4732407"/>
-                </a:cubicBezTo>
-                <a:cubicBezTo>
-                  <a:pt x="3499930" y="5970384"/>
-                  <a:pt x="1925433" y="6153690"/>
-                  <a:pt x="93046" y="6082857"/>
-                </a:cubicBezTo>
-                <a:lnTo>
-                  <a:pt x="0" y="6078450"/>
-                </a:lnTo>
-              </a:path>
-            </a:pathLst>
-          </a:custGeom>
-          <a:noFill/>
-          <a:ln w="19050">
-            <a:solidFill>
-              <a:schemeClr val="accent2">
-                <a:lumMod val="60000"/>
-                <a:lumOff val="40000"/>
-              </a:schemeClr>
-            </a:solidFill>
-          </a:ln>
-        </p:spPr>
-        <p:style>
-          <a:lnRef idx="2">
-            <a:schemeClr val="accent1">
-              <a:shade val="50000"/>
-            </a:schemeClr>
-          </a:lnRef>
-          <a:fillRef idx="1">
-            <a:schemeClr val="accent1"/>
-          </a:fillRef>
-          <a:effectRef idx="0">
-            <a:schemeClr val="accent1"/>
-          </a:effectRef>
-          <a:fontRef idx="minor">
-            <a:schemeClr val="lt1"/>
-          </a:fontRef>
-        </p:style>
-        <p:txBody>
-          <a:bodyPr wrap="square" rtlCol="0" anchor="ctr">
-            <a:noAutofit/>
-          </a:bodyPr>
-          <a:lstStyle/>
-          <a:p>
-            <a:pPr algn="ctr"/>
-            <a:endParaRPr lang="en-US">
-              <a:solidFill>
-                <a:prstClr val="white"/>
-              </a:solidFill>
-              <a:latin typeface="Avenir Next LT Pro Light"/>
-            </a:endParaRPr>
-          </a:p>
-        </p:txBody>
-      </p:sp>
-      <p:sp>
-        <p:nvSpPr>
-          <p:cNvPr id="3" name="Content Placeholder 2">
-            <a:extLst>
-              <a:ext uri="{FF2B5EF4-FFF2-40B4-BE49-F238E27FC236}">
-                <a16:creationId xmlns:a16="http://schemas.microsoft.com/office/drawing/2014/main" id="{5464266E-25D4-16D9-F06E-69F751AD75F0}"/>
-              </a:ext>
-            </a:extLst>
-          </p:cNvPr>
-          <p:cNvSpPr>
-            <a:spLocks noGrp="1"/>
-          </p:cNvSpPr>
-          <p:nvPr>
-            <p:ph idx="1"/>
-          </p:nvPr>
-        </p:nvSpPr>
-        <p:spPr>
-          <a:xfrm>
-            <a:off x="6096000" y="2286000"/>
-            <a:ext cx="5334000" cy="3810001"/>
-          </a:xfrm>
-        </p:spPr>
-        <p:txBody>
-          <a:bodyPr vert="horz" lIns="91440" tIns="45720" rIns="91440" bIns="45720" rtlCol="0">
-            <a:normAutofit/>
-          </a:bodyPr>
-          <a:lstStyle/>
-          <a:p>
-            <a:pPr marL="0" indent="0">
-              <a:buNone/>
-            </a:pPr>
-            <a:r>
-              <a:rPr lang="en-US" sz="2400" dirty="0"/>
-              <a:t>Multinomial Naïve Bayes</a:t>
-            </a:r>
-          </a:p>
-          <a:p>
-            <a:pPr marL="0" indent="0">
-              <a:buNone/>
-            </a:pPr>
-            <a:r>
-              <a:rPr lang="en-US" sz="2400"/>
-              <a:t>Uses the bayes classifier with independent gaussian curves</a:t>
-            </a:r>
-          </a:p>
-        </p:txBody>
-      </p:sp>
       <p:sp>
         <p:nvSpPr>
           <p:cNvPr id="2" name="Title 1">
             <a:extLst>
               <a:ext uri="{FF2B5EF4-FFF2-40B4-BE49-F238E27FC236}">
-                <a16:creationId xmlns:a16="http://schemas.microsoft.com/office/drawing/2014/main" id="{81DDCE4E-CD6B-422F-3AF2-A6851B445E59}"/>
+                <a16:creationId xmlns:a16="http://schemas.microsoft.com/office/drawing/2014/main" id="{2E5FDC55-520F-6B1B-EA13-150FCA0C9F3C}"/>
               </a:ext>
             </a:extLst>
           </p:cNvPr>
@@ -15107,8 +15653,8 @@
         </p:nvSpPr>
         <p:spPr>
           <a:xfrm>
-            <a:off x="6096000" y="762000"/>
-            <a:ext cx="5334000" cy="1524000"/>
+            <a:off x="762000" y="761999"/>
+            <a:ext cx="10668000" cy="5293743"/>
           </a:xfrm>
         </p:spPr>
         <p:txBody>
@@ -15117,17 +15663,19 @@
           </a:bodyPr>
           <a:lstStyle/>
           <a:p>
+            <a:pPr algn="ctr"/>
             <a:r>
-              <a:rPr lang="en-US" sz="3200"/>
-              <a:t>Current Model Used</a:t>
+              <a:rPr lang="en-US" sz="7200" b="1" dirty="0"/>
+              <a:t>Models Used</a:t>
             </a:r>
+            <a:endParaRPr lang="en-IN" sz="7200" b="1" dirty="0"/>
           </a:p>
         </p:txBody>
       </p:sp>
     </p:spTree>
     <p:extLst>
       <p:ext uri="{BB962C8B-B14F-4D97-AF65-F5344CB8AC3E}">
-        <p14:creationId xmlns:p14="http://schemas.microsoft.com/office/powerpoint/2010/main" val="2655718439"/>
+        <p14:creationId xmlns:p14="http://schemas.microsoft.com/office/powerpoint/2010/main" val="1407908705"/>
       </p:ext>
     </p:extLst>
   </p:cSld>

</xml_diff>